<commit_message>
added old data dictionary
</commit_message>
<xml_diff>
--- a/endyearproject.pptx
+++ b/endyearproject.pptx
@@ -5,7 +5,7 @@
     <p:sldMasterId id="2147483648" r:id="rId1"/>
   </p:sldMasterIdLst>
   <p:notesMasterIdLst>
-    <p:notesMasterId r:id="rId46"/>
+    <p:notesMasterId r:id="rId47"/>
   </p:notesMasterIdLst>
   <p:sldIdLst>
     <p:sldId id="256" r:id="rId2"/>
@@ -50,8 +50,9 @@
     <p:sldId id="299" r:id="rId41"/>
     <p:sldId id="303" r:id="rId42"/>
     <p:sldId id="300" r:id="rId43"/>
-    <p:sldId id="257" r:id="rId44"/>
-    <p:sldId id="305" r:id="rId45"/>
+    <p:sldId id="306" r:id="rId44"/>
+    <p:sldId id="257" r:id="rId45"/>
+    <p:sldId id="305" r:id="rId46"/>
   </p:sldIdLst>
   <p:sldSz cx="12192000" cy="6858000"/>
   <p:notesSz cx="6858000" cy="9144000"/>
@@ -197,11 +198,15 @@
             <p14:sldId id="299"/>
             <p14:sldId id="303"/>
             <p14:sldId id="300"/>
+            <p14:sldId id="306"/>
             <p14:sldId id="257"/>
             <p14:sldId id="305"/>
           </p14:sldIdLst>
         </p14:section>
       </p14:sectionLst>
+    </p:ext>
+    <p:ext uri="{EFAFB233-063F-42B5-8137-9DF3F51BA10A}">
+      <p15:sldGuideLst xmlns:p15="http://schemas.microsoft.com/office/powerpoint/2012/main"/>
     </p:ext>
   </p:extLst>
 </p:presentation>
@@ -289,7 +294,7 @@
           <a:p>
             <a:fld id="{F24F7D89-10EC-4FC9-9643-1839C0381547}" type="datetimeFigureOut">
               <a:rPr lang="en-CA" smtClean="0"/>
-              <a:t>2019-07-28</a:t>
+              <a:t>2019-07-29</a:t>
             </a:fld>
             <a:endParaRPr lang="en-CA"/>
           </a:p>
@@ -659,6 +664,174 @@
 </p:notes>
 </file>
 
+<file path=ppt/notesSlides/notesSlide2.xml><?xml version="1.0" encoding="utf-8"?>
+<p:notes xmlns:a="http://schemas.openxmlformats.org/drawingml/2006/main" xmlns:r="http://schemas.openxmlformats.org/officeDocument/2006/relationships" xmlns:p="http://schemas.openxmlformats.org/presentationml/2006/main">
+  <p:cSld>
+    <p:spTree>
+      <p:nvGrpSpPr>
+        <p:cNvPr id="1" name=""/>
+        <p:cNvGrpSpPr/>
+        <p:nvPr/>
+      </p:nvGrpSpPr>
+      <p:grpSpPr>
+        <a:xfrm>
+          <a:off x="0" y="0"/>
+          <a:ext cx="0" cy="0"/>
+          <a:chOff x="0" y="0"/>
+          <a:chExt cx="0" cy="0"/>
+        </a:xfrm>
+      </p:grpSpPr>
+      <p:sp>
+        <p:nvSpPr>
+          <p:cNvPr id="2" name="Slide Image Placeholder 1"/>
+          <p:cNvSpPr>
+            <a:spLocks noGrp="1" noRot="1" noChangeAspect="1"/>
+          </p:cNvSpPr>
+          <p:nvPr>
+            <p:ph type="sldImg"/>
+          </p:nvPr>
+        </p:nvSpPr>
+        <p:spPr/>
+      </p:sp>
+      <p:sp>
+        <p:nvSpPr>
+          <p:cNvPr id="3" name="Notes Placeholder 2"/>
+          <p:cNvSpPr>
+            <a:spLocks noGrp="1"/>
+          </p:cNvSpPr>
+          <p:nvPr>
+            <p:ph type="body" idx="1"/>
+          </p:nvPr>
+        </p:nvSpPr>
+        <p:spPr/>
+        <p:txBody>
+          <a:bodyPr/>
+          <a:lstStyle/>
+          <a:p>
+            <a:endParaRPr lang="en-CA" dirty="0"/>
+          </a:p>
+        </p:txBody>
+      </p:sp>
+      <p:sp>
+        <p:nvSpPr>
+          <p:cNvPr id="4" name="Slide Number Placeholder 3"/>
+          <p:cNvSpPr>
+            <a:spLocks noGrp="1"/>
+          </p:cNvSpPr>
+          <p:nvPr>
+            <p:ph type="sldNum" sz="quarter" idx="5"/>
+          </p:nvPr>
+        </p:nvSpPr>
+        <p:spPr/>
+        <p:txBody>
+          <a:bodyPr/>
+          <a:lstStyle/>
+          <a:p>
+            <a:fld id="{02B640A8-BC60-49C8-BC66-0FD55216E04A}" type="slidenum">
+              <a:rPr lang="en-CA" smtClean="0"/>
+              <a:t>44</a:t>
+            </a:fld>
+            <a:endParaRPr lang="en-CA"/>
+          </a:p>
+        </p:txBody>
+      </p:sp>
+    </p:spTree>
+    <p:extLst>
+      <p:ext uri="{BB962C8B-B14F-4D97-AF65-F5344CB8AC3E}">
+        <p14:creationId xmlns:p14="http://schemas.microsoft.com/office/powerpoint/2010/main" val="3772909139"/>
+      </p:ext>
+    </p:extLst>
+  </p:cSld>
+  <p:clrMapOvr>
+    <a:masterClrMapping/>
+  </p:clrMapOvr>
+</p:notes>
+</file>
+
+<file path=ppt/notesSlides/notesSlide3.xml><?xml version="1.0" encoding="utf-8"?>
+<p:notes xmlns:a="http://schemas.openxmlformats.org/drawingml/2006/main" xmlns:r="http://schemas.openxmlformats.org/officeDocument/2006/relationships" xmlns:p="http://schemas.openxmlformats.org/presentationml/2006/main">
+  <p:cSld>
+    <p:spTree>
+      <p:nvGrpSpPr>
+        <p:cNvPr id="1" name=""/>
+        <p:cNvGrpSpPr/>
+        <p:nvPr/>
+      </p:nvGrpSpPr>
+      <p:grpSpPr>
+        <a:xfrm>
+          <a:off x="0" y="0"/>
+          <a:ext cx="0" cy="0"/>
+          <a:chOff x="0" y="0"/>
+          <a:chExt cx="0" cy="0"/>
+        </a:xfrm>
+      </p:grpSpPr>
+      <p:sp>
+        <p:nvSpPr>
+          <p:cNvPr id="2" name="Slide Image Placeholder 1"/>
+          <p:cNvSpPr>
+            <a:spLocks noGrp="1" noRot="1" noChangeAspect="1"/>
+          </p:cNvSpPr>
+          <p:nvPr>
+            <p:ph type="sldImg"/>
+          </p:nvPr>
+        </p:nvSpPr>
+        <p:spPr/>
+      </p:sp>
+      <p:sp>
+        <p:nvSpPr>
+          <p:cNvPr id="3" name="Notes Placeholder 2"/>
+          <p:cNvSpPr>
+            <a:spLocks noGrp="1"/>
+          </p:cNvSpPr>
+          <p:nvPr>
+            <p:ph type="body" idx="1"/>
+          </p:nvPr>
+        </p:nvSpPr>
+        <p:spPr/>
+        <p:txBody>
+          <a:bodyPr/>
+          <a:lstStyle/>
+          <a:p>
+            <a:endParaRPr lang="en-CA" dirty="0"/>
+          </a:p>
+        </p:txBody>
+      </p:sp>
+      <p:sp>
+        <p:nvSpPr>
+          <p:cNvPr id="4" name="Slide Number Placeholder 3"/>
+          <p:cNvSpPr>
+            <a:spLocks noGrp="1"/>
+          </p:cNvSpPr>
+          <p:nvPr>
+            <p:ph type="sldNum" sz="quarter" idx="5"/>
+          </p:nvPr>
+        </p:nvSpPr>
+        <p:spPr/>
+        <p:txBody>
+          <a:bodyPr/>
+          <a:lstStyle/>
+          <a:p>
+            <a:fld id="{02B640A8-BC60-49C8-BC66-0FD55216E04A}" type="slidenum">
+              <a:rPr lang="en-CA" smtClean="0"/>
+              <a:t>45</a:t>
+            </a:fld>
+            <a:endParaRPr lang="en-CA"/>
+          </a:p>
+        </p:txBody>
+      </p:sp>
+    </p:spTree>
+    <p:extLst>
+      <p:ext uri="{BB962C8B-B14F-4D97-AF65-F5344CB8AC3E}">
+        <p14:creationId xmlns:p14="http://schemas.microsoft.com/office/powerpoint/2010/main" val="1491719553"/>
+      </p:ext>
+    </p:extLst>
+  </p:cSld>
+  <p:clrMapOvr>
+    <a:masterClrMapping/>
+  </p:clrMapOvr>
+</p:notes>
+</file>
+
 <file path=ppt/slideLayouts/slideLayout1.xml><?xml version="1.0" encoding="utf-8"?>
 <p:sldLayout xmlns:a="http://schemas.openxmlformats.org/drawingml/2006/main" xmlns:r="http://schemas.openxmlformats.org/officeDocument/2006/relationships" xmlns:p="http://schemas.openxmlformats.org/presentationml/2006/main" type="title" preserve="1">
   <p:cSld name="Title Slide">
@@ -842,7 +1015,7 @@
           <a:p>
             <a:fld id="{9237B8B8-5C2E-4E13-BB04-2A9FD0E06B43}" type="datetime1">
               <a:rPr lang="en-US" smtClean="0"/>
-              <a:t>7/28/2019</a:t>
+              <a:t>7/29/2019</a:t>
             </a:fld>
             <a:endParaRPr lang="en-US" dirty="0"/>
           </a:p>
@@ -1112,7 +1285,7 @@
           <a:p>
             <a:fld id="{8793F846-D0AD-4451-A349-844E9DB7E940}" type="datetime1">
               <a:rPr lang="en-US" smtClean="0"/>
-              <a:t>7/28/2019</a:t>
+              <a:t>7/29/2019</a:t>
             </a:fld>
             <a:endParaRPr lang="en-US" dirty="0"/>
           </a:p>
@@ -1301,7 +1474,7 @@
           <a:p>
             <a:fld id="{F89C7A0D-49F5-4F7C-ADFA-14D8E4A7C84A}" type="datetime1">
               <a:rPr lang="en-US" smtClean="0"/>
-              <a:t>7/28/2019</a:t>
+              <a:t>7/29/2019</a:t>
             </a:fld>
             <a:endParaRPr lang="en-US" dirty="0"/>
           </a:p>
@@ -1564,7 +1737,7 @@
           <a:p>
             <a:fld id="{0568BFE9-6ACB-4C17-A03F-0D357E855480}" type="datetime1">
               <a:rPr lang="en-US" smtClean="0"/>
-              <a:t>7/28/2019</a:t>
+              <a:t>7/29/2019</a:t>
             </a:fld>
             <a:endParaRPr lang="en-US" dirty="0"/>
           </a:p>
@@ -1891,7 +2064,7 @@
           <a:p>
             <a:fld id="{09CDDDCD-DE98-48CC-BEFB-F6D2D9BF1CA8}" type="datetime1">
               <a:rPr lang="en-US" smtClean="0"/>
-              <a:t>7/28/2019</a:t>
+              <a:t>7/29/2019</a:t>
             </a:fld>
             <a:endParaRPr lang="en-US" dirty="0"/>
           </a:p>
@@ -2496,7 +2669,7 @@
           <a:p>
             <a:fld id="{2D725F25-1EB3-453F-A157-201B02A32982}" type="datetime1">
               <a:rPr lang="en-US" smtClean="0"/>
-              <a:t>7/28/2019</a:t>
+              <a:t>7/29/2019</a:t>
             </a:fld>
             <a:endParaRPr lang="en-US" dirty="0"/>
           </a:p>
@@ -3338,7 +3511,7 @@
           <a:p>
             <a:fld id="{24985DA6-E545-488B-88BE-14C26D93516D}" type="datetime1">
               <a:rPr lang="en-US" smtClean="0"/>
-              <a:t>7/28/2019</a:t>
+              <a:t>7/29/2019</a:t>
             </a:fld>
             <a:endParaRPr lang="en-US" dirty="0"/>
           </a:p>
@@ -3503,7 +3676,7 @@
           <a:p>
             <a:fld id="{10AA3CF6-3460-4DC0-99CC-586FE8A6BB3D}" type="datetime1">
               <a:rPr lang="en-US" smtClean="0"/>
-              <a:t>7/28/2019</a:t>
+              <a:t>7/29/2019</a:t>
             </a:fld>
             <a:endParaRPr lang="en-US" dirty="0"/>
           </a:p>
@@ -3678,7 +3851,7 @@
           <a:p>
             <a:fld id="{45FE5D02-251F-45DE-8DB3-169883CC9CAB}" type="datetime1">
               <a:rPr lang="en-US" smtClean="0"/>
-              <a:t>7/28/2019</a:t>
+              <a:t>7/29/2019</a:t>
             </a:fld>
             <a:endParaRPr lang="en-US" dirty="0"/>
           </a:p>
@@ -3843,7 +4016,7 @@
           <a:p>
             <a:fld id="{3D89C3EB-C144-4D11-9A3E-6F7262F4DFA1}" type="datetime1">
               <a:rPr lang="en-US" smtClean="0"/>
-              <a:t>7/28/2019</a:t>
+              <a:t>7/29/2019</a:t>
             </a:fld>
             <a:endParaRPr lang="en-US" dirty="0"/>
           </a:p>
@@ -4082,7 +4255,7 @@
           <a:p>
             <a:fld id="{DC57C600-6AF8-4076-9774-F0020D3902D2}" type="datetime1">
               <a:rPr lang="en-US" smtClean="0"/>
-              <a:t>7/28/2019</a:t>
+              <a:t>7/29/2019</a:t>
             </a:fld>
             <a:endParaRPr lang="en-US" dirty="0"/>
           </a:p>
@@ -4369,7 +4542,7 @@
           <a:p>
             <a:fld id="{18792B24-29AE-45E0-9CC8-129A62274ADE}" type="datetime1">
               <a:rPr lang="en-US" smtClean="0"/>
-              <a:t>7/28/2019</a:t>
+              <a:t>7/29/2019</a:t>
             </a:fld>
             <a:endParaRPr lang="en-US" dirty="0"/>
           </a:p>
@@ -4802,7 +4975,7 @@
           <a:p>
             <a:fld id="{4AD1A743-E2B7-4414-B0AD-DEE667DC2374}" type="datetime1">
               <a:rPr lang="en-US" smtClean="0"/>
-              <a:t>7/28/2019</a:t>
+              <a:t>7/29/2019</a:t>
             </a:fld>
             <a:endParaRPr lang="en-US" dirty="0"/>
           </a:p>
@@ -4915,7 +5088,7 @@
           <a:p>
             <a:fld id="{3165539B-E85D-4413-AAE3-2392CD186986}" type="datetime1">
               <a:rPr lang="en-US" smtClean="0"/>
-              <a:t>7/28/2019</a:t>
+              <a:t>7/29/2019</a:t>
             </a:fld>
             <a:endParaRPr lang="en-US" dirty="0"/>
           </a:p>
@@ -5005,7 +5178,7 @@
           <a:p>
             <a:fld id="{A5B53C3A-84CA-4CE4-946B-A4E4211B2110}" type="datetime1">
               <a:rPr lang="en-US" smtClean="0"/>
-              <a:t>7/28/2019</a:t>
+              <a:t>7/29/2019</a:t>
             </a:fld>
             <a:endParaRPr lang="en-US" dirty="0"/>
           </a:p>
@@ -5279,7 +5452,7 @@
           <a:p>
             <a:fld id="{359E3D30-61F9-4F05-87F8-12005365FC86}" type="datetime1">
               <a:rPr lang="en-US" smtClean="0"/>
-              <a:t>7/28/2019</a:t>
+              <a:t>7/29/2019</a:t>
             </a:fld>
             <a:endParaRPr lang="en-US" dirty="0"/>
           </a:p>
@@ -5549,7 +5722,7 @@
           <a:p>
             <a:fld id="{FD0B77D8-EDF7-4657-8CE6-2BA88F28FAC6}" type="datetime1">
               <a:rPr lang="en-US" smtClean="0"/>
-              <a:t>7/28/2019</a:t>
+              <a:t>7/29/2019</a:t>
             </a:fld>
             <a:endParaRPr lang="en-US" dirty="0"/>
           </a:p>
@@ -5973,7 +6146,7 @@
           <a:p>
             <a:fld id="{EAFBB148-6A34-4BDF-8705-D093DBF6741D}" type="datetime1">
               <a:rPr lang="en-US" smtClean="0"/>
-              <a:t>7/28/2019</a:t>
+              <a:t>7/29/2019</a:t>
             </a:fld>
             <a:endParaRPr lang="en-US" dirty="0"/>
           </a:p>
@@ -27038,7 +27211,7 @@
           <p:cNvPr id="2" name="Title 1">
             <a:extLst>
               <a:ext uri="{FF2B5EF4-FFF2-40B4-BE49-F238E27FC236}">
-                <a16:creationId xmlns:a16="http://schemas.microsoft.com/office/drawing/2014/main" id="{636F71B9-C6A7-4D5D-9C68-1F859B60CD2E}"/>
+                <a16:creationId xmlns:a16="http://schemas.microsoft.com/office/drawing/2014/main" id="{4C4F1802-0E87-4132-B19B-7EDD04C44A8D}"/>
               </a:ext>
             </a:extLst>
           </p:cNvPr>
@@ -27051,19 +27224,45 @@
         </p:nvSpPr>
         <p:spPr>
           <a:xfrm>
-            <a:off x="4207700" y="2860016"/>
-            <a:ext cx="3776599" cy="974866"/>
+            <a:off x="646111" y="452718"/>
+            <a:ext cx="9404723" cy="1400530"/>
           </a:xfrm>
         </p:spPr>
         <p:txBody>
           <a:bodyPr/>
           <a:lstStyle/>
           <a:p>
-            <a:pPr algn="ctr"/>
-            <a:r>
-              <a:rPr lang="en-CA" dirty="0"/>
-              <a:t>Thank you !!!</a:t>
-            </a:r>
+            <a:r>
+              <a:rPr lang="en-US" sz="4400" dirty="0">
+                <a:solidFill>
+                  <a:schemeClr val="accent5">
+                    <a:lumMod val="75000"/>
+                  </a:schemeClr>
+                </a:solidFill>
+              </a:rPr>
+              <a:t>Reporting</a:t>
+            </a:r>
+            <a:br>
+              <a:rPr lang="en-US" sz="4400" dirty="0">
+                <a:solidFill>
+                  <a:schemeClr val="accent5">
+                    <a:lumMod val="75000"/>
+                  </a:schemeClr>
+                </a:solidFill>
+              </a:rPr>
+            </a:br>
+            <a:r>
+              <a:rPr lang="en-US" sz="4400" dirty="0">
+                <a:solidFill>
+                  <a:schemeClr val="accent1"/>
+                </a:solidFill>
+              </a:rPr>
+              <a:t>Conclusion</a:t>
+            </a:r>
+            <a:br>
+              <a:rPr lang="en-US" sz="4400" dirty="0"/>
+            </a:br>
+            <a:endParaRPr lang="en-CA" dirty="0"/>
           </a:p>
         </p:txBody>
       </p:sp>
@@ -27072,7 +27271,7 @@
           <p:cNvPr id="4" name="Slide Number Placeholder 3">
             <a:extLst>
               <a:ext uri="{FF2B5EF4-FFF2-40B4-BE49-F238E27FC236}">
-                <a16:creationId xmlns:a16="http://schemas.microsoft.com/office/drawing/2014/main" id="{EFC2BD53-2735-4C21-ABAC-4AD554B58748}"/>
+                <a16:creationId xmlns:a16="http://schemas.microsoft.com/office/drawing/2014/main" id="{68D2BE27-A31A-4475-8B30-819B96F3160F}"/>
               </a:ext>
             </a:extLst>
           </p:cNvPr>
@@ -27083,7 +27282,12 @@
             <p:ph type="sldNum" sz="quarter" idx="12"/>
           </p:nvPr>
         </p:nvSpPr>
-        <p:spPr/>
+        <p:spPr>
+          <a:xfrm>
+            <a:off x="10352540" y="295729"/>
+            <a:ext cx="838199" cy="767687"/>
+          </a:xfrm>
+        </p:spPr>
         <p:txBody>
           <a:bodyPr/>
           <a:lstStyle/>
@@ -27096,10 +27300,122 @@
           </a:p>
         </p:txBody>
       </p:sp>
+      <p:sp>
+        <p:nvSpPr>
+          <p:cNvPr id="7" name="TextBox 6">
+            <a:extLst>
+              <a:ext uri="{FF2B5EF4-FFF2-40B4-BE49-F238E27FC236}">
+                <a16:creationId xmlns:a16="http://schemas.microsoft.com/office/drawing/2014/main" id="{4D491F02-0602-4F66-AEFB-8C99A1D79C7B}"/>
+              </a:ext>
+            </a:extLst>
+          </p:cNvPr>
+          <p:cNvSpPr txBox="1"/>
+          <p:nvPr/>
+        </p:nvSpPr>
+        <p:spPr>
+          <a:xfrm>
+            <a:off x="646111" y="2272683"/>
+            <a:ext cx="10439076" cy="1754326"/>
+          </a:xfrm>
+          <a:prstGeom prst="rect">
+            <a:avLst/>
+          </a:prstGeom>
+          <a:noFill/>
+        </p:spPr>
+        <p:txBody>
+          <a:bodyPr wrap="none" rtlCol="0">
+            <a:spAutoFit/>
+          </a:bodyPr>
+          <a:lstStyle/>
+          <a:p>
+            <a:r>
+              <a:rPr lang="en-CA" dirty="0"/>
+              <a:t>Final attributes: </a:t>
+            </a:r>
+            <a:r>
+              <a:rPr lang="en-CA" dirty="0" err="1"/>
+              <a:t>MSSubClass,LotFrontage,LotArea,LotShape,Neighborhood</a:t>
+            </a:r>
+            <a:r>
+              <a:rPr lang="en-CA" dirty="0"/>
+              <a:t>,</a:t>
+            </a:r>
+          </a:p>
+          <a:p>
+            <a:r>
+              <a:rPr lang="en-CA" dirty="0"/>
+              <a:t>HouseStyle,OverallCond,YearBuilt,YearRemodAdd,RoofStyle,,Exterior1st,Exterior2nd,</a:t>
+            </a:r>
+          </a:p>
+          <a:p>
+            <a:r>
+              <a:rPr lang="en-CA" dirty="0"/>
+              <a:t>MasVnrType,ExterQual,,ExterCond,,Foundation,BsmtQual,,BsmtExposure,BsmtFinType1,</a:t>
+            </a:r>
+          </a:p>
+          <a:p>
+            <a:r>
+              <a:rPr lang="en-CA" dirty="0"/>
+              <a:t>BsmtFinSF1,BsmtFinType2,BsmtUnfSF,HeatingQC,BedroomAbvGr,KitchenAbvGr,KitchenQual,</a:t>
+            </a:r>
+          </a:p>
+          <a:p>
+            <a:r>
+              <a:rPr lang="en-CA" dirty="0"/>
+              <a:t>TotRmsAbvGrd,Fireplaces,FireplaceQu,GarageType,GarageYrBlt,GarageFinish,GarageCars,</a:t>
+            </a:r>
+          </a:p>
+          <a:p>
+            <a:r>
+              <a:rPr lang="en-CA" dirty="0" err="1"/>
+              <a:t>MoSold,YrSold,TotalBath,TotalPorchSF,TotalArea,SalePrice</a:t>
+            </a:r>
+            <a:r>
+              <a:rPr lang="en-CA" dirty="0"/>
+              <a:t>.</a:t>
+            </a:r>
+          </a:p>
+        </p:txBody>
+      </p:sp>
+      <p:sp>
+        <p:nvSpPr>
+          <p:cNvPr id="8" name="TextBox 7">
+            <a:extLst>
+              <a:ext uri="{FF2B5EF4-FFF2-40B4-BE49-F238E27FC236}">
+                <a16:creationId xmlns:a16="http://schemas.microsoft.com/office/drawing/2014/main" id="{6DC86023-05CB-4303-A91B-333B715C026E}"/>
+              </a:ext>
+            </a:extLst>
+          </p:cNvPr>
+          <p:cNvSpPr txBox="1"/>
+          <p:nvPr/>
+        </p:nvSpPr>
+        <p:spPr>
+          <a:xfrm>
+            <a:off x="727969" y="4474346"/>
+            <a:ext cx="8831264" cy="369332"/>
+          </a:xfrm>
+          <a:prstGeom prst="rect">
+            <a:avLst/>
+          </a:prstGeom>
+          <a:noFill/>
+        </p:spPr>
+        <p:txBody>
+          <a:bodyPr wrap="none" rtlCol="0">
+            <a:spAutoFit/>
+          </a:bodyPr>
+          <a:lstStyle/>
+          <a:p>
+            <a:r>
+              <a:rPr lang="en-CA" dirty="0"/>
+              <a:t>Recommend using Random Forest, however Net Elastic also give good results.</a:t>
+            </a:r>
+          </a:p>
+        </p:txBody>
+      </p:sp>
     </p:spTree>
     <p:extLst>
       <p:ext uri="{BB962C8B-B14F-4D97-AF65-F5344CB8AC3E}">
-        <p14:creationId xmlns:p14="http://schemas.microsoft.com/office/powerpoint/2010/main" val="1769354059"/>
+        <p14:creationId xmlns:p14="http://schemas.microsoft.com/office/powerpoint/2010/main" val="2403761607"/>
       </p:ext>
     </p:extLst>
   </p:cSld>
@@ -27112,6 +27428,30 @@
 <file path=ppt/slides/slide44.xml><?xml version="1.0" encoding="utf-8"?>
 <p:sld xmlns:a="http://schemas.openxmlformats.org/drawingml/2006/main" xmlns:r="http://schemas.openxmlformats.org/officeDocument/2006/relationships" xmlns:p="http://schemas.openxmlformats.org/presentationml/2006/main">
   <p:cSld>
+    <p:bg>
+      <p:bgPr>
+        <a:blipFill rotWithShape="1">
+          <a:blip r:embed="rId3">
+            <a:duotone>
+              <a:schemeClr val="bg2">
+                <a:shade val="62000"/>
+                <a:hueMod val="108000"/>
+                <a:satMod val="164000"/>
+                <a:lumMod val="69000"/>
+              </a:schemeClr>
+              <a:schemeClr val="bg2">
+                <a:tint val="96000"/>
+                <a:hueMod val="90000"/>
+                <a:satMod val="130000"/>
+                <a:lumMod val="134000"/>
+              </a:schemeClr>
+            </a:duotone>
+          </a:blip>
+          <a:stretch/>
+        </a:blipFill>
+        <a:effectLst/>
+      </p:bgPr>
+    </p:bg>
     <p:spTree>
       <p:nvGrpSpPr>
         <p:cNvPr id="1" name=""/>
@@ -27126,6 +27466,1237 @@
           <a:chExt cx="0" cy="0"/>
         </a:xfrm>
       </p:grpSpPr>
+      <p:pic>
+        <p:nvPicPr>
+          <p:cNvPr id="9" name="Picture 8">
+            <a:extLst>
+              <a:ext uri="{FF2B5EF4-FFF2-40B4-BE49-F238E27FC236}">
+                <a16:creationId xmlns:a16="http://schemas.microsoft.com/office/drawing/2014/main" id="{5D2D844C-AB64-4A03-80BE-33212E61DD07}"/>
+              </a:ext>
+              <a:ext uri="{C183D7F6-B498-43B3-948B-1728B52AA6E4}">
+                <adec:decorative xmlns:adec="http://schemas.microsoft.com/office/drawing/2017/decorative" val="1"/>
+              </a:ext>
+            </a:extLst>
+          </p:cNvPr>
+          <p:cNvPicPr>
+            <a:picLocks noGrp="1" noRot="1" noChangeAspect="1" noMove="1" noResize="1" noEditPoints="1" noAdjustHandles="1" noChangeArrowheads="1" noChangeShapeType="1" noCrop="1"/>
+          </p:cNvPicPr>
+          <p:nvPr>
+            <p:extLst>
+              <p:ext uri="{386F3935-93C4-4BCD-93E2-E3B085C9AB24}">
+                <p16:designElem xmlns:p16="http://schemas.microsoft.com/office/powerpoint/2015/main" val="1"/>
+              </p:ext>
+            </p:extLst>
+          </p:nvPr>
+        </p:nvPicPr>
+        <p:blipFill rotWithShape="1">
+          <a:blip r:embed="rId4">
+            <a:extLst>
+              <a:ext uri="{28A0092B-C50C-407E-A947-70E740481C1C}">
+                <a14:useLocalDpi xmlns:a14="http://schemas.microsoft.com/office/drawing/2010/main" val="0"/>
+              </a:ext>
+            </a:extLst>
+          </a:blip>
+          <a:srcRect l="3613"/>
+          <a:stretch/>
+        </p:blipFill>
+        <p:spPr>
+          <a:xfrm>
+            <a:off x="0" y="2669685"/>
+            <a:ext cx="4037012" cy="4188315"/>
+          </a:xfrm>
+          <a:prstGeom prst="rect">
+            <a:avLst/>
+          </a:prstGeom>
+        </p:spPr>
+      </p:pic>
+      <p:pic>
+        <p:nvPicPr>
+          <p:cNvPr id="11" name="Picture 10">
+            <a:extLst>
+              <a:ext uri="{FF2B5EF4-FFF2-40B4-BE49-F238E27FC236}">
+                <a16:creationId xmlns:a16="http://schemas.microsoft.com/office/drawing/2014/main" id="{CAAD0E9B-89C2-4268-98B4-BA7BFFF2C705}"/>
+              </a:ext>
+              <a:ext uri="{C183D7F6-B498-43B3-948B-1728B52AA6E4}">
+                <adec:decorative xmlns:adec="http://schemas.microsoft.com/office/drawing/2017/decorative" val="1"/>
+              </a:ext>
+            </a:extLst>
+          </p:cNvPr>
+          <p:cNvPicPr>
+            <a:picLocks noGrp="1" noRot="1" noChangeAspect="1" noMove="1" noResize="1" noEditPoints="1" noAdjustHandles="1" noChangeArrowheads="1" noChangeShapeType="1" noCrop="1"/>
+          </p:cNvPicPr>
+          <p:nvPr>
+            <p:extLst>
+              <p:ext uri="{386F3935-93C4-4BCD-93E2-E3B085C9AB24}">
+                <p16:designElem xmlns:p16="http://schemas.microsoft.com/office/powerpoint/2015/main" val="1"/>
+              </p:ext>
+            </p:extLst>
+          </p:nvPr>
+        </p:nvPicPr>
+        <p:blipFill rotWithShape="1">
+          <a:blip r:embed="rId5">
+            <a:extLst>
+              <a:ext uri="{28A0092B-C50C-407E-A947-70E740481C1C}">
+                <a14:useLocalDpi xmlns:a14="http://schemas.microsoft.com/office/drawing/2010/main" val="0"/>
+              </a:ext>
+            </a:extLst>
+          </a:blip>
+          <a:srcRect l="35640"/>
+          <a:stretch/>
+        </p:blipFill>
+        <p:spPr>
+          <a:xfrm>
+            <a:off x="0" y="2892347"/>
+            <a:ext cx="1522412" cy="2365453"/>
+          </a:xfrm>
+          <a:prstGeom prst="rect">
+            <a:avLst/>
+          </a:prstGeom>
+        </p:spPr>
+      </p:pic>
+      <p:sp>
+        <p:nvSpPr>
+          <p:cNvPr id="13" name="Oval 12">
+            <a:extLst>
+              <a:ext uri="{FF2B5EF4-FFF2-40B4-BE49-F238E27FC236}">
+                <a16:creationId xmlns:a16="http://schemas.microsoft.com/office/drawing/2014/main" id="{1653AB08-C531-42A8-AA8D-C2ABAE87CCE6}"/>
+              </a:ext>
+              <a:ext uri="{C183D7F6-B498-43B3-948B-1728B52AA6E4}">
+                <adec:decorative xmlns:adec="http://schemas.microsoft.com/office/drawing/2017/decorative" val="1"/>
+              </a:ext>
+            </a:extLst>
+          </p:cNvPr>
+          <p:cNvSpPr>
+            <a:spLocks noGrp="1" noRot="1" noChangeAspect="1" noMove="1" noResize="1" noEditPoints="1" noAdjustHandles="1" noChangeArrowheads="1" noChangeShapeType="1" noTextEdit="1"/>
+          </p:cNvSpPr>
+          <p:nvPr>
+            <p:extLst>
+              <p:ext uri="{386F3935-93C4-4BCD-93E2-E3B085C9AB24}">
+                <p16:designElem xmlns:p16="http://schemas.microsoft.com/office/powerpoint/2015/main" val="1"/>
+              </p:ext>
+            </p:extLst>
+          </p:nvPr>
+        </p:nvSpPr>
+        <p:spPr>
+          <a:xfrm>
+            <a:off x="8609012" y="1676400"/>
+            <a:ext cx="2819400" cy="2819400"/>
+          </a:xfrm>
+          <a:prstGeom prst="ellipse">
+            <a:avLst/>
+          </a:prstGeom>
+          <a:gradFill flip="none" rotWithShape="1">
+            <a:gsLst>
+              <a:gs pos="0">
+                <a:schemeClr val="bg2">
+                  <a:lumMod val="40000"/>
+                  <a:lumOff val="60000"/>
+                  <a:alpha val="7000"/>
+                </a:schemeClr>
+              </a:gs>
+              <a:gs pos="69000">
+                <a:schemeClr val="bg2">
+                  <a:lumMod val="40000"/>
+                  <a:lumOff val="60000"/>
+                  <a:alpha val="0"/>
+                </a:schemeClr>
+              </a:gs>
+              <a:gs pos="36000">
+                <a:schemeClr val="bg2">
+                  <a:lumMod val="40000"/>
+                  <a:lumOff val="60000"/>
+                  <a:alpha val="6000"/>
+                </a:schemeClr>
+              </a:gs>
+            </a:gsLst>
+            <a:path path="circle">
+              <a:fillToRect l="50000" t="50000" r="50000" b="50000"/>
+            </a:path>
+            <a:tileRect/>
+          </a:gradFill>
+          <a:ln>
+            <a:noFill/>
+          </a:ln>
+          <a:effectLst/>
+        </p:spPr>
+        <p:style>
+          <a:lnRef idx="1">
+            <a:schemeClr val="accent1"/>
+          </a:lnRef>
+          <a:fillRef idx="3">
+            <a:schemeClr val="accent1"/>
+          </a:fillRef>
+          <a:effectRef idx="2">
+            <a:schemeClr val="accent1"/>
+          </a:effectRef>
+          <a:fontRef idx="minor">
+            <a:schemeClr val="lt1"/>
+          </a:fontRef>
+        </p:style>
+      </p:sp>
+      <p:pic>
+        <p:nvPicPr>
+          <p:cNvPr id="15" name="Picture 14">
+            <a:extLst>
+              <a:ext uri="{FF2B5EF4-FFF2-40B4-BE49-F238E27FC236}">
+                <a16:creationId xmlns:a16="http://schemas.microsoft.com/office/drawing/2014/main" id="{72E47EEC-33C8-4EC3-8BFC-BB02B4171FDA}"/>
+              </a:ext>
+              <a:ext uri="{C183D7F6-B498-43B3-948B-1728B52AA6E4}">
+                <adec:decorative xmlns:adec="http://schemas.microsoft.com/office/drawing/2017/decorative" val="1"/>
+              </a:ext>
+            </a:extLst>
+          </p:cNvPr>
+          <p:cNvPicPr>
+            <a:picLocks noGrp="1" noRot="1" noChangeAspect="1" noMove="1" noResize="1" noEditPoints="1" noAdjustHandles="1" noChangeArrowheads="1" noChangeShapeType="1" noCrop="1"/>
+          </p:cNvPicPr>
+          <p:nvPr>
+            <p:extLst>
+              <p:ext uri="{386F3935-93C4-4BCD-93E2-E3B085C9AB24}">
+                <p16:designElem xmlns:p16="http://schemas.microsoft.com/office/powerpoint/2015/main" val="1"/>
+              </p:ext>
+            </p:extLst>
+          </p:nvPr>
+        </p:nvPicPr>
+        <p:blipFill rotWithShape="1">
+          <a:blip r:embed="rId6">
+            <a:extLst>
+              <a:ext uri="{28A0092B-C50C-407E-A947-70E740481C1C}">
+                <a14:useLocalDpi xmlns:a14="http://schemas.microsoft.com/office/drawing/2010/main" val="0"/>
+              </a:ext>
+            </a:extLst>
+          </a:blip>
+          <a:srcRect t="28813"/>
+          <a:stretch/>
+        </p:blipFill>
+        <p:spPr>
+          <a:xfrm>
+            <a:off x="7999412" y="0"/>
+            <a:ext cx="1603387" cy="1141407"/>
+          </a:xfrm>
+          <a:prstGeom prst="rect">
+            <a:avLst/>
+          </a:prstGeom>
+        </p:spPr>
+      </p:pic>
+      <p:pic>
+        <p:nvPicPr>
+          <p:cNvPr id="17" name="Picture 16">
+            <a:extLst>
+              <a:ext uri="{FF2B5EF4-FFF2-40B4-BE49-F238E27FC236}">
+                <a16:creationId xmlns:a16="http://schemas.microsoft.com/office/drawing/2014/main" id="{A8BC9CC6-50D5-4C61-9EDE-315A1B5F14E4}"/>
+              </a:ext>
+              <a:ext uri="{C183D7F6-B498-43B3-948B-1728B52AA6E4}">
+                <adec:decorative xmlns:adec="http://schemas.microsoft.com/office/drawing/2017/decorative" val="1"/>
+              </a:ext>
+            </a:extLst>
+          </p:cNvPr>
+          <p:cNvPicPr>
+            <a:picLocks noGrp="1" noRot="1" noChangeAspect="1" noMove="1" noResize="1" noEditPoints="1" noAdjustHandles="1" noChangeArrowheads="1" noChangeShapeType="1" noCrop="1"/>
+          </p:cNvPicPr>
+          <p:nvPr>
+            <p:extLst>
+              <p:ext uri="{386F3935-93C4-4BCD-93E2-E3B085C9AB24}">
+                <p16:designElem xmlns:p16="http://schemas.microsoft.com/office/powerpoint/2015/main" val="1"/>
+              </p:ext>
+            </p:extLst>
+          </p:nvPr>
+        </p:nvPicPr>
+        <p:blipFill rotWithShape="1">
+          <a:blip r:embed="rId7">
+            <a:extLst>
+              <a:ext uri="{28A0092B-C50C-407E-A947-70E740481C1C}">
+                <a14:useLocalDpi xmlns:a14="http://schemas.microsoft.com/office/drawing/2010/main" val="0"/>
+              </a:ext>
+            </a:extLst>
+          </a:blip>
+          <a:srcRect b="23320"/>
+          <a:stretch/>
+        </p:blipFill>
+        <p:spPr>
+          <a:xfrm>
+            <a:off x="8609012" y="6096000"/>
+            <a:ext cx="993734" cy="762000"/>
+          </a:xfrm>
+          <a:prstGeom prst="rect">
+            <a:avLst/>
+          </a:prstGeom>
+        </p:spPr>
+      </p:pic>
+      <p:sp>
+        <p:nvSpPr>
+          <p:cNvPr id="19" name="Rectangle 18">
+            <a:extLst>
+              <a:ext uri="{FF2B5EF4-FFF2-40B4-BE49-F238E27FC236}">
+                <a16:creationId xmlns:a16="http://schemas.microsoft.com/office/drawing/2014/main" id="{CED2641B-4430-4CF4-89AB-3FADDD630F25}"/>
+              </a:ext>
+              <a:ext uri="{C183D7F6-B498-43B3-948B-1728B52AA6E4}">
+                <adec:decorative xmlns:adec="http://schemas.microsoft.com/office/drawing/2017/decorative" val="1"/>
+              </a:ext>
+            </a:extLst>
+          </p:cNvPr>
+          <p:cNvSpPr>
+            <a:spLocks noGrp="1" noRot="1" noChangeAspect="1" noMove="1" noResize="1" noEditPoints="1" noAdjustHandles="1" noChangeArrowheads="1" noChangeShapeType="1" noTextEdit="1"/>
+          </p:cNvSpPr>
+          <p:nvPr>
+            <p:extLst>
+              <p:ext uri="{386F3935-93C4-4BCD-93E2-E3B085C9AB24}">
+                <p16:designElem xmlns:p16="http://schemas.microsoft.com/office/powerpoint/2015/main" val="1"/>
+              </p:ext>
+            </p:extLst>
+          </p:nvPr>
+        </p:nvSpPr>
+        <p:spPr>
+          <a:xfrm>
+            <a:off x="10437812" y="0"/>
+            <a:ext cx="685800" cy="1143000"/>
+          </a:xfrm>
+          <a:prstGeom prst="rect">
+            <a:avLst/>
+          </a:prstGeom>
+          <a:solidFill>
+            <a:schemeClr val="accent1"/>
+          </a:solidFill>
+          <a:ln>
+            <a:noFill/>
+          </a:ln>
+        </p:spPr>
+        <p:style>
+          <a:lnRef idx="1">
+            <a:schemeClr val="accent1"/>
+          </a:lnRef>
+          <a:fillRef idx="3">
+            <a:schemeClr val="accent1"/>
+          </a:fillRef>
+          <a:effectRef idx="2">
+            <a:schemeClr val="accent1"/>
+          </a:effectRef>
+          <a:fontRef idx="minor">
+            <a:schemeClr val="lt1"/>
+          </a:fontRef>
+        </p:style>
+      </p:sp>
+      <p:sp useBgFill="1">
+        <p:nvSpPr>
+          <p:cNvPr id="21" name="Rectangle 20">
+            <a:extLst>
+              <a:ext uri="{FF2B5EF4-FFF2-40B4-BE49-F238E27FC236}">
+                <a16:creationId xmlns:a16="http://schemas.microsoft.com/office/drawing/2014/main" id="{C28D0172-F2E0-4763-9C35-F022664959D8}"/>
+              </a:ext>
+              <a:ext uri="{C183D7F6-B498-43B3-948B-1728B52AA6E4}">
+                <adec:decorative xmlns:adec="http://schemas.microsoft.com/office/drawing/2017/decorative" val="1"/>
+              </a:ext>
+            </a:extLst>
+          </p:cNvPr>
+          <p:cNvSpPr>
+            <a:spLocks noGrp="1" noRot="1" noChangeAspect="1" noMove="1" noResize="1" noEditPoints="1" noAdjustHandles="1" noChangeArrowheads="1" noChangeShapeType="1" noTextEdit="1"/>
+          </p:cNvSpPr>
+          <p:nvPr>
+            <p:extLst>
+              <p:ext uri="{386F3935-93C4-4BCD-93E2-E3B085C9AB24}">
+                <p16:designElem xmlns:p16="http://schemas.microsoft.com/office/powerpoint/2015/main" val="1"/>
+              </p:ext>
+            </p:extLst>
+          </p:nvPr>
+        </p:nvSpPr>
+        <p:spPr>
+          <a:xfrm>
+            <a:off x="0" y="-5"/>
+            <a:ext cx="12191695" cy="4730744"/>
+          </a:xfrm>
+          <a:prstGeom prst="rect">
+            <a:avLst/>
+          </a:prstGeom>
+          <a:ln>
+            <a:noFill/>
+          </a:ln>
+        </p:spPr>
+        <p:style>
+          <a:lnRef idx="2">
+            <a:schemeClr val="accent1">
+              <a:shade val="50000"/>
+            </a:schemeClr>
+          </a:lnRef>
+          <a:fillRef idx="1">
+            <a:schemeClr val="accent1"/>
+          </a:fillRef>
+          <a:effectRef idx="0">
+            <a:schemeClr val="accent1"/>
+          </a:effectRef>
+          <a:fontRef idx="minor">
+            <a:schemeClr val="lt1"/>
+          </a:fontRef>
+        </p:style>
+        <p:txBody>
+          <a:bodyPr rtlCol="0" anchor="ctr"/>
+          <a:lstStyle/>
+          <a:p>
+            <a:pPr algn="ctr"/>
+            <a:endParaRPr lang="en-US"/>
+          </a:p>
+        </p:txBody>
+      </p:sp>
+      <p:sp>
+        <p:nvSpPr>
+          <p:cNvPr id="23" name="Freeform: Shape 22">
+            <a:extLst>
+              <a:ext uri="{FF2B5EF4-FFF2-40B4-BE49-F238E27FC236}">
+                <a16:creationId xmlns:a16="http://schemas.microsoft.com/office/drawing/2014/main" id="{DF6FB2B2-CE21-407F-B22E-302DADC2C3D3}"/>
+              </a:ext>
+              <a:ext uri="{C183D7F6-B498-43B3-948B-1728B52AA6E4}">
+                <adec:decorative xmlns:adec="http://schemas.microsoft.com/office/drawing/2017/decorative" val="1"/>
+              </a:ext>
+            </a:extLst>
+          </p:cNvPr>
+          <p:cNvSpPr>
+            <a:spLocks noGrp="1" noRot="1" noChangeAspect="1" noMove="1" noResize="1" noEditPoints="1" noAdjustHandles="1" noChangeArrowheads="1" noChangeShapeType="1" noTextEdit="1"/>
+          </p:cNvSpPr>
+          <p:nvPr>
+            <p:extLst>
+              <p:ext uri="{386F3935-93C4-4BCD-93E2-E3B085C9AB24}">
+                <p16:designElem xmlns:p16="http://schemas.microsoft.com/office/powerpoint/2015/main" val="1"/>
+              </p:ext>
+            </p:extLst>
+          </p:nvPr>
+        </p:nvSpPr>
+        <p:spPr>
+          <a:xfrm>
+            <a:off x="0" y="4055533"/>
+            <a:ext cx="12192000" cy="2802467"/>
+          </a:xfrm>
+          <a:custGeom>
+            <a:avLst/>
+            <a:gdLst>
+              <a:gd name="connsiteX0" fmla="*/ 1 w 12192000"/>
+              <a:gd name="connsiteY0" fmla="*/ 0 h 2802467"/>
+              <a:gd name="connsiteX1" fmla="*/ 71932 w 12192000"/>
+              <a:gd name="connsiteY1" fmla="*/ 12261 h 2802467"/>
+              <a:gd name="connsiteX2" fmla="*/ 282848 w 12192000"/>
+              <a:gd name="connsiteY2" fmla="*/ 48342 h 2802467"/>
+              <a:gd name="connsiteX3" fmla="*/ 436464 w 12192000"/>
+              <a:gd name="connsiteY3" fmla="*/ 73565 h 2802467"/>
+              <a:gd name="connsiteX4" fmla="*/ 619339 w 12192000"/>
+              <a:gd name="connsiteY4" fmla="*/ 100188 h 2802467"/>
+              <a:gd name="connsiteX5" fmla="*/ 836351 w 12192000"/>
+              <a:gd name="connsiteY5" fmla="*/ 132066 h 2802467"/>
+              <a:gd name="connsiteX6" fmla="*/ 1076528 w 12192000"/>
+              <a:gd name="connsiteY6" fmla="*/ 165696 h 2802467"/>
+              <a:gd name="connsiteX7" fmla="*/ 1347183 w 12192000"/>
+              <a:gd name="connsiteY7" fmla="*/ 201077 h 2802467"/>
+              <a:gd name="connsiteX8" fmla="*/ 1642223 w 12192000"/>
+              <a:gd name="connsiteY8" fmla="*/ 238560 h 2802467"/>
+              <a:gd name="connsiteX9" fmla="*/ 1962864 w 12192000"/>
+              <a:gd name="connsiteY9" fmla="*/ 276043 h 2802467"/>
+              <a:gd name="connsiteX10" fmla="*/ 2304232 w 12192000"/>
+              <a:gd name="connsiteY10" fmla="*/ 314226 h 2802467"/>
+              <a:gd name="connsiteX11" fmla="*/ 2672421 w 12192000"/>
+              <a:gd name="connsiteY11" fmla="*/ 349608 h 2802467"/>
+              <a:gd name="connsiteX12" fmla="*/ 3057678 w 12192000"/>
+              <a:gd name="connsiteY12" fmla="*/ 383587 h 2802467"/>
+              <a:gd name="connsiteX13" fmla="*/ 3464881 w 12192000"/>
+              <a:gd name="connsiteY13" fmla="*/ 414415 h 2802467"/>
+              <a:gd name="connsiteX14" fmla="*/ 3889152 w 12192000"/>
+              <a:gd name="connsiteY14" fmla="*/ 443840 h 2802467"/>
+              <a:gd name="connsiteX15" fmla="*/ 4331710 w 12192000"/>
+              <a:gd name="connsiteY15" fmla="*/ 471515 h 2802467"/>
+              <a:gd name="connsiteX16" fmla="*/ 4558476 w 12192000"/>
+              <a:gd name="connsiteY16" fmla="*/ 481323 h 2802467"/>
+              <a:gd name="connsiteX17" fmla="*/ 4790118 w 12192000"/>
+              <a:gd name="connsiteY17" fmla="*/ 492183 h 2802467"/>
+              <a:gd name="connsiteX18" fmla="*/ 5025418 w 12192000"/>
+              <a:gd name="connsiteY18" fmla="*/ 502342 h 2802467"/>
+              <a:gd name="connsiteX19" fmla="*/ 5261937 w 12192000"/>
+              <a:gd name="connsiteY19" fmla="*/ 508998 h 2802467"/>
+              <a:gd name="connsiteX20" fmla="*/ 5503332 w 12192000"/>
+              <a:gd name="connsiteY20" fmla="*/ 514953 h 2802467"/>
+              <a:gd name="connsiteX21" fmla="*/ 5747166 w 12192000"/>
+              <a:gd name="connsiteY21" fmla="*/ 521259 h 2802467"/>
+              <a:gd name="connsiteX22" fmla="*/ 5995877 w 12192000"/>
+              <a:gd name="connsiteY22" fmla="*/ 525462 h 2802467"/>
+              <a:gd name="connsiteX23" fmla="*/ 6247026 w 12192000"/>
+              <a:gd name="connsiteY23" fmla="*/ 525462 h 2802467"/>
+              <a:gd name="connsiteX24" fmla="*/ 6500613 w 12192000"/>
+              <a:gd name="connsiteY24" fmla="*/ 527564 h 2802467"/>
+              <a:gd name="connsiteX25" fmla="*/ 6756639 w 12192000"/>
+              <a:gd name="connsiteY25" fmla="*/ 525462 h 2802467"/>
+              <a:gd name="connsiteX26" fmla="*/ 7016322 w 12192000"/>
+              <a:gd name="connsiteY26" fmla="*/ 521259 h 2802467"/>
+              <a:gd name="connsiteX27" fmla="*/ 7276005 w 12192000"/>
+              <a:gd name="connsiteY27" fmla="*/ 517405 h 2802467"/>
+              <a:gd name="connsiteX28" fmla="*/ 7539345 w 12192000"/>
+              <a:gd name="connsiteY28" fmla="*/ 508998 h 2802467"/>
+              <a:gd name="connsiteX29" fmla="*/ 7805124 w 12192000"/>
+              <a:gd name="connsiteY29" fmla="*/ 500240 h 2802467"/>
+              <a:gd name="connsiteX30" fmla="*/ 8070903 w 12192000"/>
+              <a:gd name="connsiteY30" fmla="*/ 490081 h 2802467"/>
+              <a:gd name="connsiteX31" fmla="*/ 8339121 w 12192000"/>
+              <a:gd name="connsiteY31" fmla="*/ 475719 h 2802467"/>
+              <a:gd name="connsiteX32" fmla="*/ 8609776 w 12192000"/>
+              <a:gd name="connsiteY32" fmla="*/ 458553 h 2802467"/>
+              <a:gd name="connsiteX33" fmla="*/ 8881651 w 12192000"/>
+              <a:gd name="connsiteY33" fmla="*/ 442089 h 2802467"/>
+              <a:gd name="connsiteX34" fmla="*/ 9153526 w 12192000"/>
+              <a:gd name="connsiteY34" fmla="*/ 421070 h 2802467"/>
+              <a:gd name="connsiteX35" fmla="*/ 9429058 w 12192000"/>
+              <a:gd name="connsiteY35" fmla="*/ 395848 h 2802467"/>
+              <a:gd name="connsiteX36" fmla="*/ 9700933 w 12192000"/>
+              <a:gd name="connsiteY36" fmla="*/ 370626 h 2802467"/>
+              <a:gd name="connsiteX37" fmla="*/ 9977684 w 12192000"/>
+              <a:gd name="connsiteY37" fmla="*/ 341550 h 2802467"/>
+              <a:gd name="connsiteX38" fmla="*/ 10255655 w 12192000"/>
+              <a:gd name="connsiteY38" fmla="*/ 309672 h 2802467"/>
+              <a:gd name="connsiteX39" fmla="*/ 10529968 w 12192000"/>
+              <a:gd name="connsiteY39" fmla="*/ 276043 h 2802467"/>
+              <a:gd name="connsiteX40" fmla="*/ 10807939 w 12192000"/>
+              <a:gd name="connsiteY40" fmla="*/ 236808 h 2802467"/>
+              <a:gd name="connsiteX41" fmla="*/ 11084690 w 12192000"/>
+              <a:gd name="connsiteY41" fmla="*/ 194771 h 2802467"/>
+              <a:gd name="connsiteX42" fmla="*/ 11362661 w 12192000"/>
+              <a:gd name="connsiteY42" fmla="*/ 153085 h 2802467"/>
+              <a:gd name="connsiteX43" fmla="*/ 11639412 w 12192000"/>
+              <a:gd name="connsiteY43" fmla="*/ 104392 h 2802467"/>
+              <a:gd name="connsiteX44" fmla="*/ 11914945 w 12192000"/>
+              <a:gd name="connsiteY44" fmla="*/ 54648 h 2802467"/>
+              <a:gd name="connsiteX45" fmla="*/ 12191696 w 12192000"/>
+              <a:gd name="connsiteY45" fmla="*/ 2452 h 2802467"/>
+              <a:gd name="connsiteX46" fmla="*/ 12191696 w 12192000"/>
+              <a:gd name="connsiteY46" fmla="*/ 2236410 h 2802467"/>
+              <a:gd name="connsiteX47" fmla="*/ 12192000 w 12192000"/>
+              <a:gd name="connsiteY47" fmla="*/ 2236410 h 2802467"/>
+              <a:gd name="connsiteX48" fmla="*/ 12192000 w 12192000"/>
+              <a:gd name="connsiteY48" fmla="*/ 2802467 h 2802467"/>
+              <a:gd name="connsiteX49" fmla="*/ 12191696 w 12192000"/>
+              <a:gd name="connsiteY49" fmla="*/ 2802467 h 2802467"/>
+              <a:gd name="connsiteX50" fmla="*/ 0 w 12192000"/>
+              <a:gd name="connsiteY50" fmla="*/ 2802467 h 2802467"/>
+              <a:gd name="connsiteX51" fmla="*/ 0 w 12192000"/>
+              <a:gd name="connsiteY51" fmla="*/ 2236410 h 2802467"/>
+              <a:gd name="connsiteX52" fmla="*/ 1 w 12192000"/>
+              <a:gd name="connsiteY52" fmla="*/ 2236410 h 2802467"/>
+            </a:gdLst>
+            <a:ahLst/>
+            <a:cxnLst>
+              <a:cxn ang="0">
+                <a:pos x="connsiteX0" y="connsiteY0"/>
+              </a:cxn>
+              <a:cxn ang="0">
+                <a:pos x="connsiteX1" y="connsiteY1"/>
+              </a:cxn>
+              <a:cxn ang="0">
+                <a:pos x="connsiteX2" y="connsiteY2"/>
+              </a:cxn>
+              <a:cxn ang="0">
+                <a:pos x="connsiteX3" y="connsiteY3"/>
+              </a:cxn>
+              <a:cxn ang="0">
+                <a:pos x="connsiteX4" y="connsiteY4"/>
+              </a:cxn>
+              <a:cxn ang="0">
+                <a:pos x="connsiteX5" y="connsiteY5"/>
+              </a:cxn>
+              <a:cxn ang="0">
+                <a:pos x="connsiteX6" y="connsiteY6"/>
+              </a:cxn>
+              <a:cxn ang="0">
+                <a:pos x="connsiteX7" y="connsiteY7"/>
+              </a:cxn>
+              <a:cxn ang="0">
+                <a:pos x="connsiteX8" y="connsiteY8"/>
+              </a:cxn>
+              <a:cxn ang="0">
+                <a:pos x="connsiteX9" y="connsiteY9"/>
+              </a:cxn>
+              <a:cxn ang="0">
+                <a:pos x="connsiteX10" y="connsiteY10"/>
+              </a:cxn>
+              <a:cxn ang="0">
+                <a:pos x="connsiteX11" y="connsiteY11"/>
+              </a:cxn>
+              <a:cxn ang="0">
+                <a:pos x="connsiteX12" y="connsiteY12"/>
+              </a:cxn>
+              <a:cxn ang="0">
+                <a:pos x="connsiteX13" y="connsiteY13"/>
+              </a:cxn>
+              <a:cxn ang="0">
+                <a:pos x="connsiteX14" y="connsiteY14"/>
+              </a:cxn>
+              <a:cxn ang="0">
+                <a:pos x="connsiteX15" y="connsiteY15"/>
+              </a:cxn>
+              <a:cxn ang="0">
+                <a:pos x="connsiteX16" y="connsiteY16"/>
+              </a:cxn>
+              <a:cxn ang="0">
+                <a:pos x="connsiteX17" y="connsiteY17"/>
+              </a:cxn>
+              <a:cxn ang="0">
+                <a:pos x="connsiteX18" y="connsiteY18"/>
+              </a:cxn>
+              <a:cxn ang="0">
+                <a:pos x="connsiteX19" y="connsiteY19"/>
+              </a:cxn>
+              <a:cxn ang="0">
+                <a:pos x="connsiteX20" y="connsiteY20"/>
+              </a:cxn>
+              <a:cxn ang="0">
+                <a:pos x="connsiteX21" y="connsiteY21"/>
+              </a:cxn>
+              <a:cxn ang="0">
+                <a:pos x="connsiteX22" y="connsiteY22"/>
+              </a:cxn>
+              <a:cxn ang="0">
+                <a:pos x="connsiteX23" y="connsiteY23"/>
+              </a:cxn>
+              <a:cxn ang="0">
+                <a:pos x="connsiteX24" y="connsiteY24"/>
+              </a:cxn>
+              <a:cxn ang="0">
+                <a:pos x="connsiteX25" y="connsiteY25"/>
+              </a:cxn>
+              <a:cxn ang="0">
+                <a:pos x="connsiteX26" y="connsiteY26"/>
+              </a:cxn>
+              <a:cxn ang="0">
+                <a:pos x="connsiteX27" y="connsiteY27"/>
+              </a:cxn>
+              <a:cxn ang="0">
+                <a:pos x="connsiteX28" y="connsiteY28"/>
+              </a:cxn>
+              <a:cxn ang="0">
+                <a:pos x="connsiteX29" y="connsiteY29"/>
+              </a:cxn>
+              <a:cxn ang="0">
+                <a:pos x="connsiteX30" y="connsiteY30"/>
+              </a:cxn>
+              <a:cxn ang="0">
+                <a:pos x="connsiteX31" y="connsiteY31"/>
+              </a:cxn>
+              <a:cxn ang="0">
+                <a:pos x="connsiteX32" y="connsiteY32"/>
+              </a:cxn>
+              <a:cxn ang="0">
+                <a:pos x="connsiteX33" y="connsiteY33"/>
+              </a:cxn>
+              <a:cxn ang="0">
+                <a:pos x="connsiteX34" y="connsiteY34"/>
+              </a:cxn>
+              <a:cxn ang="0">
+                <a:pos x="connsiteX35" y="connsiteY35"/>
+              </a:cxn>
+              <a:cxn ang="0">
+                <a:pos x="connsiteX36" y="connsiteY36"/>
+              </a:cxn>
+              <a:cxn ang="0">
+                <a:pos x="connsiteX37" y="connsiteY37"/>
+              </a:cxn>
+              <a:cxn ang="0">
+                <a:pos x="connsiteX38" y="connsiteY38"/>
+              </a:cxn>
+              <a:cxn ang="0">
+                <a:pos x="connsiteX39" y="connsiteY39"/>
+              </a:cxn>
+              <a:cxn ang="0">
+                <a:pos x="connsiteX40" y="connsiteY40"/>
+              </a:cxn>
+              <a:cxn ang="0">
+                <a:pos x="connsiteX41" y="connsiteY41"/>
+              </a:cxn>
+              <a:cxn ang="0">
+                <a:pos x="connsiteX42" y="connsiteY42"/>
+              </a:cxn>
+              <a:cxn ang="0">
+                <a:pos x="connsiteX43" y="connsiteY43"/>
+              </a:cxn>
+              <a:cxn ang="0">
+                <a:pos x="connsiteX44" y="connsiteY44"/>
+              </a:cxn>
+              <a:cxn ang="0">
+                <a:pos x="connsiteX45" y="connsiteY45"/>
+              </a:cxn>
+              <a:cxn ang="0">
+                <a:pos x="connsiteX46" y="connsiteY46"/>
+              </a:cxn>
+              <a:cxn ang="0">
+                <a:pos x="connsiteX47" y="connsiteY47"/>
+              </a:cxn>
+              <a:cxn ang="0">
+                <a:pos x="connsiteX48" y="connsiteY48"/>
+              </a:cxn>
+              <a:cxn ang="0">
+                <a:pos x="connsiteX49" y="connsiteY49"/>
+              </a:cxn>
+              <a:cxn ang="0">
+                <a:pos x="connsiteX50" y="connsiteY50"/>
+              </a:cxn>
+              <a:cxn ang="0">
+                <a:pos x="connsiteX51" y="connsiteY51"/>
+              </a:cxn>
+              <a:cxn ang="0">
+                <a:pos x="connsiteX52" y="connsiteY52"/>
+              </a:cxn>
+            </a:cxnLst>
+            <a:rect l="l" t="t" r="r" b="b"/>
+            <a:pathLst>
+              <a:path w="12192000" h="2802467">
+                <a:moveTo>
+                  <a:pt x="1" y="0"/>
+                </a:moveTo>
+                <a:lnTo>
+                  <a:pt x="71932" y="12261"/>
+                </a:lnTo>
+                <a:lnTo>
+                  <a:pt x="282848" y="48342"/>
+                </a:lnTo>
+                <a:lnTo>
+                  <a:pt x="436464" y="73565"/>
+                </a:lnTo>
+                <a:lnTo>
+                  <a:pt x="619339" y="100188"/>
+                </a:lnTo>
+                <a:lnTo>
+                  <a:pt x="836351" y="132066"/>
+                </a:lnTo>
+                <a:lnTo>
+                  <a:pt x="1076528" y="165696"/>
+                </a:lnTo>
+                <a:lnTo>
+                  <a:pt x="1347183" y="201077"/>
+                </a:lnTo>
+                <a:lnTo>
+                  <a:pt x="1642223" y="238560"/>
+                </a:lnTo>
+                <a:lnTo>
+                  <a:pt x="1962864" y="276043"/>
+                </a:lnTo>
+                <a:lnTo>
+                  <a:pt x="2304232" y="314226"/>
+                </a:lnTo>
+                <a:lnTo>
+                  <a:pt x="2672421" y="349608"/>
+                </a:lnTo>
+                <a:lnTo>
+                  <a:pt x="3057678" y="383587"/>
+                </a:lnTo>
+                <a:lnTo>
+                  <a:pt x="3464881" y="414415"/>
+                </a:lnTo>
+                <a:lnTo>
+                  <a:pt x="3889152" y="443840"/>
+                </a:lnTo>
+                <a:lnTo>
+                  <a:pt x="4331710" y="471515"/>
+                </a:lnTo>
+                <a:lnTo>
+                  <a:pt x="4558476" y="481323"/>
+                </a:lnTo>
+                <a:lnTo>
+                  <a:pt x="4790118" y="492183"/>
+                </a:lnTo>
+                <a:lnTo>
+                  <a:pt x="5025418" y="502342"/>
+                </a:lnTo>
+                <a:lnTo>
+                  <a:pt x="5261937" y="508998"/>
+                </a:lnTo>
+                <a:lnTo>
+                  <a:pt x="5503332" y="514953"/>
+                </a:lnTo>
+                <a:lnTo>
+                  <a:pt x="5747166" y="521259"/>
+                </a:lnTo>
+                <a:lnTo>
+                  <a:pt x="5995877" y="525462"/>
+                </a:lnTo>
+                <a:lnTo>
+                  <a:pt x="6247026" y="525462"/>
+                </a:lnTo>
+                <a:lnTo>
+                  <a:pt x="6500613" y="527564"/>
+                </a:lnTo>
+                <a:lnTo>
+                  <a:pt x="6756639" y="525462"/>
+                </a:lnTo>
+                <a:lnTo>
+                  <a:pt x="7016322" y="521259"/>
+                </a:lnTo>
+                <a:lnTo>
+                  <a:pt x="7276005" y="517405"/>
+                </a:lnTo>
+                <a:lnTo>
+                  <a:pt x="7539345" y="508998"/>
+                </a:lnTo>
+                <a:lnTo>
+                  <a:pt x="7805124" y="500240"/>
+                </a:lnTo>
+                <a:lnTo>
+                  <a:pt x="8070903" y="490081"/>
+                </a:lnTo>
+                <a:lnTo>
+                  <a:pt x="8339121" y="475719"/>
+                </a:lnTo>
+                <a:lnTo>
+                  <a:pt x="8609776" y="458553"/>
+                </a:lnTo>
+                <a:lnTo>
+                  <a:pt x="8881651" y="442089"/>
+                </a:lnTo>
+                <a:lnTo>
+                  <a:pt x="9153526" y="421070"/>
+                </a:lnTo>
+                <a:lnTo>
+                  <a:pt x="9429058" y="395848"/>
+                </a:lnTo>
+                <a:lnTo>
+                  <a:pt x="9700933" y="370626"/>
+                </a:lnTo>
+                <a:lnTo>
+                  <a:pt x="9977684" y="341550"/>
+                </a:lnTo>
+                <a:lnTo>
+                  <a:pt x="10255655" y="309672"/>
+                </a:lnTo>
+                <a:lnTo>
+                  <a:pt x="10529968" y="276043"/>
+                </a:lnTo>
+                <a:lnTo>
+                  <a:pt x="10807939" y="236808"/>
+                </a:lnTo>
+                <a:lnTo>
+                  <a:pt x="11084690" y="194771"/>
+                </a:lnTo>
+                <a:lnTo>
+                  <a:pt x="11362661" y="153085"/>
+                </a:lnTo>
+                <a:lnTo>
+                  <a:pt x="11639412" y="104392"/>
+                </a:lnTo>
+                <a:lnTo>
+                  <a:pt x="11914945" y="54648"/>
+                </a:lnTo>
+                <a:lnTo>
+                  <a:pt x="12191696" y="2452"/>
+                </a:lnTo>
+                <a:lnTo>
+                  <a:pt x="12191696" y="2236410"/>
+                </a:lnTo>
+                <a:lnTo>
+                  <a:pt x="12192000" y="2236410"/>
+                </a:lnTo>
+                <a:lnTo>
+                  <a:pt x="12192000" y="2802467"/>
+                </a:lnTo>
+                <a:lnTo>
+                  <a:pt x="12191696" y="2802467"/>
+                </a:lnTo>
+                <a:lnTo>
+                  <a:pt x="0" y="2802467"/>
+                </a:lnTo>
+                <a:lnTo>
+                  <a:pt x="0" y="2236410"/>
+                </a:lnTo>
+                <a:lnTo>
+                  <a:pt x="1" y="2236410"/>
+                </a:lnTo>
+                <a:close/>
+              </a:path>
+            </a:pathLst>
+          </a:custGeom>
+          <a:solidFill>
+            <a:schemeClr val="tx2"/>
+          </a:solidFill>
+          <a:ln>
+            <a:noFill/>
+          </a:ln>
+        </p:spPr>
+        <p:style>
+          <a:lnRef idx="2">
+            <a:schemeClr val="accent1">
+              <a:shade val="50000"/>
+            </a:schemeClr>
+          </a:lnRef>
+          <a:fillRef idx="1003">
+            <a:schemeClr val="dk2"/>
+          </a:fillRef>
+          <a:effectRef idx="0">
+            <a:schemeClr val="accent1"/>
+          </a:effectRef>
+          <a:fontRef idx="minor">
+            <a:schemeClr val="lt1"/>
+          </a:fontRef>
+        </p:style>
+        <p:txBody>
+          <a:bodyPr rtlCol="0" anchor="ctr"/>
+          <a:lstStyle/>
+          <a:p>
+            <a:pPr algn="ctr"/>
+            <a:endParaRPr lang="en-US"/>
+          </a:p>
+        </p:txBody>
+      </p:sp>
+      <p:sp>
+        <p:nvSpPr>
+          <p:cNvPr id="25" name="Freeform 16">
+            <a:extLst>
+              <a:ext uri="{FF2B5EF4-FFF2-40B4-BE49-F238E27FC236}">
+                <a16:creationId xmlns:a16="http://schemas.microsoft.com/office/drawing/2014/main" id="{9F2851FB-E841-4509-8A6D-A416376EA380}"/>
+              </a:ext>
+              <a:ext uri="{C183D7F6-B498-43B3-948B-1728B52AA6E4}">
+                <adec:decorative xmlns:adec="http://schemas.microsoft.com/office/drawing/2017/decorative" val="1"/>
+              </a:ext>
+            </a:extLst>
+          </p:cNvPr>
+          <p:cNvSpPr>
+            <a:spLocks noGrp="1" noRot="1" noChangeAspect="1" noMove="1" noResize="1" noEditPoints="1" noAdjustHandles="1" noChangeArrowheads="1" noChangeShapeType="1" noTextEdit="1"/>
+          </p:cNvSpPr>
+          <p:nvPr>
+            <p:extLst>
+              <p:ext uri="{386F3935-93C4-4BCD-93E2-E3B085C9AB24}">
+                <p16:designElem xmlns:p16="http://schemas.microsoft.com/office/powerpoint/2015/main" val="1"/>
+              </p:ext>
+            </p:extLst>
+          </p:nvPr>
+        </p:nvSpPr>
+        <p:spPr>
+          <a:xfrm>
+            <a:off x="8719939" y="3753695"/>
+            <a:ext cx="3472060" cy="825932"/>
+          </a:xfrm>
+          <a:custGeom>
+            <a:avLst/>
+            <a:gdLst>
+              <a:gd name="connsiteX0" fmla="*/ 3470310 w 3472060"/>
+              <a:gd name="connsiteY0" fmla="*/ 0 h 825932"/>
+              <a:gd name="connsiteX1" fmla="*/ 3472060 w 3472060"/>
+              <a:gd name="connsiteY1" fmla="*/ 12850 h 825932"/>
+              <a:gd name="connsiteX2" fmla="*/ 3472060 w 3472060"/>
+              <a:gd name="connsiteY2" fmla="*/ 480529 h 825932"/>
+              <a:gd name="connsiteX3" fmla="*/ 3363699 w 3472060"/>
+              <a:gd name="connsiteY3" fmla="*/ 498471 h 825932"/>
+              <a:gd name="connsiteX4" fmla="*/ 42060 w 3472060"/>
+              <a:gd name="connsiteY4" fmla="*/ 824486 h 825932"/>
+              <a:gd name="connsiteX5" fmla="*/ 0 w 3472060"/>
+              <a:gd name="connsiteY5" fmla="*/ 758452 h 825932"/>
+              <a:gd name="connsiteX6" fmla="*/ 188014 w 3472060"/>
+              <a:gd name="connsiteY6" fmla="*/ 735602 h 825932"/>
+              <a:gd name="connsiteX7" fmla="*/ 284087 w 3472060"/>
+              <a:gd name="connsiteY7" fmla="*/ 722590 h 825932"/>
+              <a:gd name="connsiteX8" fmla="*/ 382288 w 3472060"/>
+              <a:gd name="connsiteY8" fmla="*/ 709392 h 825932"/>
+              <a:gd name="connsiteX9" fmla="*/ 481858 w 3472060"/>
+              <a:gd name="connsiteY9" fmla="*/ 695774 h 825932"/>
+              <a:gd name="connsiteX10" fmla="*/ 581897 w 3472060"/>
+              <a:gd name="connsiteY10" fmla="*/ 680711 h 825932"/>
+              <a:gd name="connsiteX11" fmla="*/ 683670 w 3472060"/>
+              <a:gd name="connsiteY11" fmla="*/ 665256 h 825932"/>
+              <a:gd name="connsiteX12" fmla="*/ 787206 w 3472060"/>
+              <a:gd name="connsiteY12" fmla="*/ 649587 h 825932"/>
+              <a:gd name="connsiteX13" fmla="*/ 892019 w 3472060"/>
+              <a:gd name="connsiteY13" fmla="*/ 632968 h 825932"/>
+              <a:gd name="connsiteX14" fmla="*/ 997620 w 3472060"/>
+              <a:gd name="connsiteY14" fmla="*/ 614667 h 825932"/>
+              <a:gd name="connsiteX15" fmla="*/ 1104727 w 3472060"/>
+              <a:gd name="connsiteY15" fmla="*/ 596741 h 825932"/>
+              <a:gd name="connsiteX16" fmla="*/ 1212669 w 3472060"/>
+              <a:gd name="connsiteY16" fmla="*/ 577397 h 825932"/>
+              <a:gd name="connsiteX17" fmla="*/ 1321506 w 3472060"/>
+              <a:gd name="connsiteY17" fmla="*/ 556988 h 825932"/>
+              <a:gd name="connsiteX18" fmla="*/ 1430709 w 3472060"/>
+              <a:gd name="connsiteY18" fmla="*/ 536607 h 825932"/>
+              <a:gd name="connsiteX19" fmla="*/ 1541050 w 3472060"/>
+              <a:gd name="connsiteY19" fmla="*/ 514481 h 825932"/>
+              <a:gd name="connsiteX20" fmla="*/ 1652805 w 3472060"/>
+              <a:gd name="connsiteY20" fmla="*/ 492202 h 825932"/>
+              <a:gd name="connsiteX21" fmla="*/ 1763708 w 3472060"/>
+              <a:gd name="connsiteY21" fmla="*/ 469161 h 825932"/>
+              <a:gd name="connsiteX22" fmla="*/ 1875795 w 3472060"/>
+              <a:gd name="connsiteY22" fmla="*/ 444641 h 825932"/>
+              <a:gd name="connsiteX23" fmla="*/ 1989128 w 3472060"/>
+              <a:gd name="connsiteY23" fmla="*/ 418995 h 825932"/>
+              <a:gd name="connsiteX24" fmla="*/ 2102476 w 3472060"/>
+              <a:gd name="connsiteY24" fmla="*/ 393438 h 825932"/>
+              <a:gd name="connsiteX25" fmla="*/ 2215549 w 3472060"/>
+              <a:gd name="connsiteY25" fmla="*/ 366291 h 825932"/>
+              <a:gd name="connsiteX26" fmla="*/ 2330490 w 3472060"/>
+              <a:gd name="connsiteY26" fmla="*/ 337455 h 825932"/>
+              <a:gd name="connsiteX27" fmla="*/ 2443333 w 3472060"/>
+              <a:gd name="connsiteY27" fmla="*/ 308983 h 825932"/>
+              <a:gd name="connsiteX28" fmla="*/ 2558014 w 3472060"/>
+              <a:gd name="connsiteY28" fmla="*/ 278646 h 825932"/>
+              <a:gd name="connsiteX29" fmla="*/ 2673621 w 3472060"/>
+              <a:gd name="connsiteY29" fmla="*/ 247421 h 825932"/>
+              <a:gd name="connsiteX30" fmla="*/ 2787008 w 3472060"/>
+              <a:gd name="connsiteY30" fmla="*/ 215853 h 825932"/>
+              <a:gd name="connsiteX31" fmla="*/ 2901442 w 3472060"/>
+              <a:gd name="connsiteY31" fmla="*/ 182011 h 825932"/>
+              <a:gd name="connsiteX32" fmla="*/ 3015722 w 3472060"/>
+              <a:gd name="connsiteY32" fmla="*/ 147286 h 825932"/>
+              <a:gd name="connsiteX33" fmla="*/ 3130018 w 3472060"/>
+              <a:gd name="connsiteY33" fmla="*/ 112649 h 825932"/>
+              <a:gd name="connsiteX34" fmla="*/ 3243551 w 3472060"/>
+              <a:gd name="connsiteY34" fmla="*/ 75688 h 825932"/>
+              <a:gd name="connsiteX35" fmla="*/ 3356992 w 3472060"/>
+              <a:gd name="connsiteY35" fmla="*/ 38197 h 825932"/>
+              <a:gd name="connsiteX36" fmla="*/ 3470310 w 3472060"/>
+              <a:gd name="connsiteY36" fmla="*/ 0 h 825932"/>
+            </a:gdLst>
+            <a:ahLst/>
+            <a:cxnLst>
+              <a:cxn ang="0">
+                <a:pos x="connsiteX0" y="connsiteY0"/>
+              </a:cxn>
+              <a:cxn ang="0">
+                <a:pos x="connsiteX1" y="connsiteY1"/>
+              </a:cxn>
+              <a:cxn ang="0">
+                <a:pos x="connsiteX2" y="connsiteY2"/>
+              </a:cxn>
+              <a:cxn ang="0">
+                <a:pos x="connsiteX3" y="connsiteY3"/>
+              </a:cxn>
+              <a:cxn ang="0">
+                <a:pos x="connsiteX4" y="connsiteY4"/>
+              </a:cxn>
+              <a:cxn ang="0">
+                <a:pos x="connsiteX5" y="connsiteY5"/>
+              </a:cxn>
+              <a:cxn ang="0">
+                <a:pos x="connsiteX6" y="connsiteY6"/>
+              </a:cxn>
+              <a:cxn ang="0">
+                <a:pos x="connsiteX7" y="connsiteY7"/>
+              </a:cxn>
+              <a:cxn ang="0">
+                <a:pos x="connsiteX8" y="connsiteY8"/>
+              </a:cxn>
+              <a:cxn ang="0">
+                <a:pos x="connsiteX9" y="connsiteY9"/>
+              </a:cxn>
+              <a:cxn ang="0">
+                <a:pos x="connsiteX10" y="connsiteY10"/>
+              </a:cxn>
+              <a:cxn ang="0">
+                <a:pos x="connsiteX11" y="connsiteY11"/>
+              </a:cxn>
+              <a:cxn ang="0">
+                <a:pos x="connsiteX12" y="connsiteY12"/>
+              </a:cxn>
+              <a:cxn ang="0">
+                <a:pos x="connsiteX13" y="connsiteY13"/>
+              </a:cxn>
+              <a:cxn ang="0">
+                <a:pos x="connsiteX14" y="connsiteY14"/>
+              </a:cxn>
+              <a:cxn ang="0">
+                <a:pos x="connsiteX15" y="connsiteY15"/>
+              </a:cxn>
+              <a:cxn ang="0">
+                <a:pos x="connsiteX16" y="connsiteY16"/>
+              </a:cxn>
+              <a:cxn ang="0">
+                <a:pos x="connsiteX17" y="connsiteY17"/>
+              </a:cxn>
+              <a:cxn ang="0">
+                <a:pos x="connsiteX18" y="connsiteY18"/>
+              </a:cxn>
+              <a:cxn ang="0">
+                <a:pos x="connsiteX19" y="connsiteY19"/>
+              </a:cxn>
+              <a:cxn ang="0">
+                <a:pos x="connsiteX20" y="connsiteY20"/>
+              </a:cxn>
+              <a:cxn ang="0">
+                <a:pos x="connsiteX21" y="connsiteY21"/>
+              </a:cxn>
+              <a:cxn ang="0">
+                <a:pos x="connsiteX22" y="connsiteY22"/>
+              </a:cxn>
+              <a:cxn ang="0">
+                <a:pos x="connsiteX23" y="connsiteY23"/>
+              </a:cxn>
+              <a:cxn ang="0">
+                <a:pos x="connsiteX24" y="connsiteY24"/>
+              </a:cxn>
+              <a:cxn ang="0">
+                <a:pos x="connsiteX25" y="connsiteY25"/>
+              </a:cxn>
+              <a:cxn ang="0">
+                <a:pos x="connsiteX26" y="connsiteY26"/>
+              </a:cxn>
+              <a:cxn ang="0">
+                <a:pos x="connsiteX27" y="connsiteY27"/>
+              </a:cxn>
+              <a:cxn ang="0">
+                <a:pos x="connsiteX28" y="connsiteY28"/>
+              </a:cxn>
+              <a:cxn ang="0">
+                <a:pos x="connsiteX29" y="connsiteY29"/>
+              </a:cxn>
+              <a:cxn ang="0">
+                <a:pos x="connsiteX30" y="connsiteY30"/>
+              </a:cxn>
+              <a:cxn ang="0">
+                <a:pos x="connsiteX31" y="connsiteY31"/>
+              </a:cxn>
+              <a:cxn ang="0">
+                <a:pos x="connsiteX32" y="connsiteY32"/>
+              </a:cxn>
+              <a:cxn ang="0">
+                <a:pos x="connsiteX33" y="connsiteY33"/>
+              </a:cxn>
+              <a:cxn ang="0">
+                <a:pos x="connsiteX34" y="connsiteY34"/>
+              </a:cxn>
+              <a:cxn ang="0">
+                <a:pos x="connsiteX35" y="connsiteY35"/>
+              </a:cxn>
+              <a:cxn ang="0">
+                <a:pos x="connsiteX36" y="connsiteY36"/>
+              </a:cxn>
+            </a:cxnLst>
+            <a:rect l="l" t="t" r="r" b="b"/>
+            <a:pathLst>
+              <a:path w="3472060" h="825932">
+                <a:moveTo>
+                  <a:pt x="3470310" y="0"/>
+                </a:moveTo>
+                <a:lnTo>
+                  <a:pt x="3472060" y="12850"/>
+                </a:lnTo>
+                <a:lnTo>
+                  <a:pt x="3472060" y="480529"/>
+                </a:lnTo>
+                <a:lnTo>
+                  <a:pt x="3363699" y="498471"/>
+                </a:lnTo>
+                <a:cubicBezTo>
+                  <a:pt x="2435623" y="645518"/>
+                  <a:pt x="603076" y="844866"/>
+                  <a:pt x="42060" y="824486"/>
+                </a:cubicBezTo>
+                <a:cubicBezTo>
+                  <a:pt x="28151" y="802425"/>
+                  <a:pt x="13909" y="780513"/>
+                  <a:pt x="0" y="758452"/>
+                </a:cubicBezTo>
+                <a:lnTo>
+                  <a:pt x="188014" y="735602"/>
+                </a:lnTo>
+                <a:lnTo>
+                  <a:pt x="284087" y="722590"/>
+                </a:lnTo>
+                <a:lnTo>
+                  <a:pt x="382288" y="709392"/>
+                </a:lnTo>
+                <a:lnTo>
+                  <a:pt x="481858" y="695774"/>
+                </a:lnTo>
+                <a:lnTo>
+                  <a:pt x="581897" y="680711"/>
+                </a:lnTo>
+                <a:lnTo>
+                  <a:pt x="683670" y="665256"/>
+                </a:lnTo>
+                <a:lnTo>
+                  <a:pt x="787206" y="649587"/>
+                </a:lnTo>
+                <a:lnTo>
+                  <a:pt x="892019" y="632968"/>
+                </a:lnTo>
+                <a:lnTo>
+                  <a:pt x="997620" y="614667"/>
+                </a:lnTo>
+                <a:lnTo>
+                  <a:pt x="1104727" y="596741"/>
+                </a:lnTo>
+                <a:lnTo>
+                  <a:pt x="1212669" y="577397"/>
+                </a:lnTo>
+                <a:lnTo>
+                  <a:pt x="1321506" y="556988"/>
+                </a:lnTo>
+                <a:lnTo>
+                  <a:pt x="1430709" y="536607"/>
+                </a:lnTo>
+                <a:lnTo>
+                  <a:pt x="1541050" y="514481"/>
+                </a:lnTo>
+                <a:lnTo>
+                  <a:pt x="1652805" y="492202"/>
+                </a:lnTo>
+                <a:lnTo>
+                  <a:pt x="1763708" y="469161"/>
+                </a:lnTo>
+                <a:lnTo>
+                  <a:pt x="1875795" y="444641"/>
+                </a:lnTo>
+                <a:lnTo>
+                  <a:pt x="1989128" y="418995"/>
+                </a:lnTo>
+                <a:lnTo>
+                  <a:pt x="2102476" y="393438"/>
+                </a:lnTo>
+                <a:lnTo>
+                  <a:pt x="2215549" y="366291"/>
+                </a:lnTo>
+                <a:lnTo>
+                  <a:pt x="2330490" y="337455"/>
+                </a:lnTo>
+                <a:lnTo>
+                  <a:pt x="2443333" y="308983"/>
+                </a:lnTo>
+                <a:lnTo>
+                  <a:pt x="2558014" y="278646"/>
+                </a:lnTo>
+                <a:lnTo>
+                  <a:pt x="2673621" y="247421"/>
+                </a:lnTo>
+                <a:lnTo>
+                  <a:pt x="2787008" y="215853"/>
+                </a:lnTo>
+                <a:lnTo>
+                  <a:pt x="2901442" y="182011"/>
+                </a:lnTo>
+                <a:lnTo>
+                  <a:pt x="3015722" y="147286"/>
+                </a:lnTo>
+                <a:lnTo>
+                  <a:pt x="3130018" y="112649"/>
+                </a:lnTo>
+                <a:lnTo>
+                  <a:pt x="3243551" y="75688"/>
+                </a:lnTo>
+                <a:lnTo>
+                  <a:pt x="3356992" y="38197"/>
+                </a:lnTo>
+                <a:lnTo>
+                  <a:pt x="3470310" y="0"/>
+                </a:lnTo>
+                <a:close/>
+              </a:path>
+            </a:pathLst>
+          </a:custGeom>
+          <a:solidFill>
+            <a:schemeClr val="tx1">
+              <a:alpha val="20000"/>
+            </a:schemeClr>
+          </a:solidFill>
+          <a:ln>
+            <a:noFill/>
+          </a:ln>
+        </p:spPr>
+        <p:txBody>
+          <a:bodyPr rtlCol="0" anchor="ctr"/>
+          <a:lstStyle/>
+          <a:p>
+            <a:pPr algn="ctr"/>
+            <a:endParaRPr lang="en-US">
+              <a:solidFill>
+                <a:schemeClr val="tx1"/>
+              </a:solidFill>
+            </a:endParaRPr>
+          </a:p>
+        </p:txBody>
+      </p:sp>
       <p:sp>
         <p:nvSpPr>
           <p:cNvPr id="2" name="Title 1">
@@ -27142,14 +28713,22 @@
             <p:ph type="title"/>
           </p:nvPr>
         </p:nvSpPr>
-        <p:spPr/>
-        <p:txBody>
-          <a:bodyPr/>
-          <a:lstStyle/>
-          <a:p>
-            <a:r>
-              <a:rPr lang="en-CA" dirty="0"/>
-              <a:t>Questions???</a:t>
+        <p:spPr>
+          <a:xfrm>
+            <a:off x="965505" y="623571"/>
+            <a:ext cx="10260990" cy="3523885"/>
+          </a:xfrm>
+        </p:spPr>
+        <p:txBody>
+          <a:bodyPr vert="horz" lIns="91440" tIns="45720" rIns="91440" bIns="45720" rtlCol="0" anchor="b">
+            <a:normAutofit/>
+          </a:bodyPr>
+          <a:lstStyle/>
+          <a:p>
+            <a:pPr algn="ctr"/>
+            <a:r>
+              <a:rPr lang="en-US" sz="8000"/>
+              <a:t>Thank you !!!</a:t>
             </a:r>
           </a:p>
         </p:txBody>
@@ -27170,23 +28749,1614 @@
             <p:ph type="sldNum" sz="quarter" idx="12"/>
           </p:nvPr>
         </p:nvSpPr>
-        <p:spPr/>
-        <p:txBody>
-          <a:bodyPr/>
-          <a:lstStyle/>
-          <a:p>
+        <p:spPr>
+          <a:xfrm>
+            <a:off x="11040512" y="6355080"/>
+            <a:ext cx="838199" cy="301752"/>
+          </a:xfrm>
+        </p:spPr>
+        <p:txBody>
+          <a:bodyPr vert="horz" lIns="91440" tIns="45720" rIns="91440" bIns="45720" rtlCol="0" anchor="ctr">
+            <a:normAutofit/>
+          </a:bodyPr>
+          <a:lstStyle/>
+          <a:p>
+            <a:pPr algn="l">
+              <a:lnSpc>
+                <a:spcPct val="90000"/>
+              </a:lnSpc>
+              <a:spcAft>
+                <a:spcPts val="600"/>
+              </a:spcAft>
+            </a:pPr>
             <a:fld id="{D57F1E4F-1CFF-5643-939E-02111984F565}" type="slidenum">
-              <a:rPr lang="en-US" smtClean="0"/>
+              <a:rPr lang="en-US" sz="1400">
+                <a:solidFill>
+                  <a:schemeClr val="bg1">
+                    <a:alpha val="60000"/>
+                  </a:schemeClr>
+                </a:solidFill>
+              </a:rPr>
+              <a:pPr algn="l">
+                <a:lnSpc>
+                  <a:spcPct val="90000"/>
+                </a:lnSpc>
+                <a:spcAft>
+                  <a:spcPts val="600"/>
+                </a:spcAft>
+              </a:pPr>
               <a:t>44</a:t>
             </a:fld>
-            <a:endParaRPr lang="en-US" dirty="0"/>
-          </a:p>
-        </p:txBody>
-      </p:sp>
+            <a:endParaRPr lang="en-US" sz="1400">
+              <a:solidFill>
+                <a:schemeClr val="bg1">
+                  <a:alpha val="60000"/>
+                </a:schemeClr>
+              </a:solidFill>
+            </a:endParaRPr>
+          </a:p>
+        </p:txBody>
+      </p:sp>
+      <p:pic>
+        <p:nvPicPr>
+          <p:cNvPr id="18" name="Picture 17">
+            <a:extLst>
+              <a:ext uri="{FF2B5EF4-FFF2-40B4-BE49-F238E27FC236}">
+                <a16:creationId xmlns:a16="http://schemas.microsoft.com/office/drawing/2014/main" id="{DEA344AF-76AD-4224-B704-5FD1F87EFEE8}"/>
+              </a:ext>
+            </a:extLst>
+          </p:cNvPr>
+          <p:cNvPicPr>
+            <a:picLocks noChangeAspect="1"/>
+          </p:cNvPicPr>
+          <p:nvPr/>
+        </p:nvPicPr>
+        <p:blipFill>
+          <a:blip r:embed="rId8"/>
+          <a:stretch>
+            <a:fillRect/>
+          </a:stretch>
+        </p:blipFill>
+        <p:spPr>
+          <a:xfrm>
+            <a:off x="8982075" y="6644259"/>
+            <a:ext cx="3209925" cy="209550"/>
+          </a:xfrm>
+          <a:prstGeom prst="rect">
+            <a:avLst/>
+          </a:prstGeom>
+        </p:spPr>
+      </p:pic>
     </p:spTree>
     <p:extLst>
       <p:ext uri="{BB962C8B-B14F-4D97-AF65-F5344CB8AC3E}">
-        <p14:creationId xmlns:p14="http://schemas.microsoft.com/office/powerpoint/2010/main" val="1440343004"/>
+        <p14:creationId xmlns:p14="http://schemas.microsoft.com/office/powerpoint/2010/main" val="1769354059"/>
+      </p:ext>
+    </p:extLst>
+  </p:cSld>
+  <p:clrMapOvr>
+    <a:masterClrMapping/>
+  </p:clrMapOvr>
+</p:sld>
+</file>
+
+<file path=ppt/slides/slide45.xml><?xml version="1.0" encoding="utf-8"?>
+<p:sld xmlns:a="http://schemas.openxmlformats.org/drawingml/2006/main" xmlns:r="http://schemas.openxmlformats.org/officeDocument/2006/relationships" xmlns:p="http://schemas.openxmlformats.org/presentationml/2006/main">
+  <p:cSld>
+    <p:bg>
+      <p:bgPr>
+        <a:blipFill rotWithShape="1">
+          <a:blip r:embed="rId3">
+            <a:duotone>
+              <a:schemeClr val="bg2">
+                <a:shade val="62000"/>
+                <a:hueMod val="108000"/>
+                <a:satMod val="164000"/>
+                <a:lumMod val="69000"/>
+              </a:schemeClr>
+              <a:schemeClr val="bg2">
+                <a:tint val="96000"/>
+                <a:hueMod val="90000"/>
+                <a:satMod val="130000"/>
+                <a:lumMod val="134000"/>
+              </a:schemeClr>
+            </a:duotone>
+          </a:blip>
+          <a:stretch/>
+        </a:blipFill>
+        <a:effectLst/>
+      </p:bgPr>
+    </p:bg>
+    <p:spTree>
+      <p:nvGrpSpPr>
+        <p:cNvPr id="1" name=""/>
+        <p:cNvGrpSpPr/>
+        <p:nvPr/>
+      </p:nvGrpSpPr>
+      <p:grpSpPr>
+        <a:xfrm>
+          <a:off x="0" y="0"/>
+          <a:ext cx="0" cy="0"/>
+          <a:chOff x="0" y="0"/>
+          <a:chExt cx="0" cy="0"/>
+        </a:xfrm>
+      </p:grpSpPr>
+      <p:pic>
+        <p:nvPicPr>
+          <p:cNvPr id="9" name="Picture 8">
+            <a:extLst>
+              <a:ext uri="{FF2B5EF4-FFF2-40B4-BE49-F238E27FC236}">
+                <a16:creationId xmlns:a16="http://schemas.microsoft.com/office/drawing/2014/main" id="{5D2D844C-AB64-4A03-80BE-33212E61DD07}"/>
+              </a:ext>
+              <a:ext uri="{C183D7F6-B498-43B3-948B-1728B52AA6E4}">
+                <adec:decorative xmlns:adec="http://schemas.microsoft.com/office/drawing/2017/decorative" val="1"/>
+              </a:ext>
+            </a:extLst>
+          </p:cNvPr>
+          <p:cNvPicPr>
+            <a:picLocks noGrp="1" noRot="1" noChangeAspect="1" noMove="1" noResize="1" noEditPoints="1" noAdjustHandles="1" noChangeArrowheads="1" noChangeShapeType="1" noCrop="1"/>
+          </p:cNvPicPr>
+          <p:nvPr>
+            <p:extLst>
+              <p:ext uri="{386F3935-93C4-4BCD-93E2-E3B085C9AB24}">
+                <p16:designElem xmlns:p16="http://schemas.microsoft.com/office/powerpoint/2015/main" val="1"/>
+              </p:ext>
+            </p:extLst>
+          </p:nvPr>
+        </p:nvPicPr>
+        <p:blipFill rotWithShape="1">
+          <a:blip r:embed="rId4">
+            <a:extLst>
+              <a:ext uri="{28A0092B-C50C-407E-A947-70E740481C1C}">
+                <a14:useLocalDpi xmlns:a14="http://schemas.microsoft.com/office/drawing/2010/main" val="0"/>
+              </a:ext>
+            </a:extLst>
+          </a:blip>
+          <a:srcRect l="3613"/>
+          <a:stretch/>
+        </p:blipFill>
+        <p:spPr>
+          <a:xfrm>
+            <a:off x="0" y="2669685"/>
+            <a:ext cx="4037012" cy="4188315"/>
+          </a:xfrm>
+          <a:prstGeom prst="rect">
+            <a:avLst/>
+          </a:prstGeom>
+        </p:spPr>
+      </p:pic>
+      <p:pic>
+        <p:nvPicPr>
+          <p:cNvPr id="11" name="Picture 10">
+            <a:extLst>
+              <a:ext uri="{FF2B5EF4-FFF2-40B4-BE49-F238E27FC236}">
+                <a16:creationId xmlns:a16="http://schemas.microsoft.com/office/drawing/2014/main" id="{CAAD0E9B-89C2-4268-98B4-BA7BFFF2C705}"/>
+              </a:ext>
+              <a:ext uri="{C183D7F6-B498-43B3-948B-1728B52AA6E4}">
+                <adec:decorative xmlns:adec="http://schemas.microsoft.com/office/drawing/2017/decorative" val="1"/>
+              </a:ext>
+            </a:extLst>
+          </p:cNvPr>
+          <p:cNvPicPr>
+            <a:picLocks noGrp="1" noRot="1" noChangeAspect="1" noMove="1" noResize="1" noEditPoints="1" noAdjustHandles="1" noChangeArrowheads="1" noChangeShapeType="1" noCrop="1"/>
+          </p:cNvPicPr>
+          <p:nvPr>
+            <p:extLst>
+              <p:ext uri="{386F3935-93C4-4BCD-93E2-E3B085C9AB24}">
+                <p16:designElem xmlns:p16="http://schemas.microsoft.com/office/powerpoint/2015/main" val="1"/>
+              </p:ext>
+            </p:extLst>
+          </p:nvPr>
+        </p:nvPicPr>
+        <p:blipFill rotWithShape="1">
+          <a:blip r:embed="rId5">
+            <a:extLst>
+              <a:ext uri="{28A0092B-C50C-407E-A947-70E740481C1C}">
+                <a14:useLocalDpi xmlns:a14="http://schemas.microsoft.com/office/drawing/2010/main" val="0"/>
+              </a:ext>
+            </a:extLst>
+          </a:blip>
+          <a:srcRect l="35640"/>
+          <a:stretch/>
+        </p:blipFill>
+        <p:spPr>
+          <a:xfrm>
+            <a:off x="0" y="2892347"/>
+            <a:ext cx="1522412" cy="2365453"/>
+          </a:xfrm>
+          <a:prstGeom prst="rect">
+            <a:avLst/>
+          </a:prstGeom>
+        </p:spPr>
+      </p:pic>
+      <p:sp>
+        <p:nvSpPr>
+          <p:cNvPr id="13" name="Oval 12">
+            <a:extLst>
+              <a:ext uri="{FF2B5EF4-FFF2-40B4-BE49-F238E27FC236}">
+                <a16:creationId xmlns:a16="http://schemas.microsoft.com/office/drawing/2014/main" id="{1653AB08-C531-42A8-AA8D-C2ABAE87CCE6}"/>
+              </a:ext>
+              <a:ext uri="{C183D7F6-B498-43B3-948B-1728B52AA6E4}">
+                <adec:decorative xmlns:adec="http://schemas.microsoft.com/office/drawing/2017/decorative" val="1"/>
+              </a:ext>
+            </a:extLst>
+          </p:cNvPr>
+          <p:cNvSpPr>
+            <a:spLocks noGrp="1" noRot="1" noChangeAspect="1" noMove="1" noResize="1" noEditPoints="1" noAdjustHandles="1" noChangeArrowheads="1" noChangeShapeType="1" noTextEdit="1"/>
+          </p:cNvSpPr>
+          <p:nvPr>
+            <p:extLst>
+              <p:ext uri="{386F3935-93C4-4BCD-93E2-E3B085C9AB24}">
+                <p16:designElem xmlns:p16="http://schemas.microsoft.com/office/powerpoint/2015/main" val="1"/>
+              </p:ext>
+            </p:extLst>
+          </p:nvPr>
+        </p:nvSpPr>
+        <p:spPr>
+          <a:xfrm>
+            <a:off x="8609012" y="1676400"/>
+            <a:ext cx="2819400" cy="2819400"/>
+          </a:xfrm>
+          <a:prstGeom prst="ellipse">
+            <a:avLst/>
+          </a:prstGeom>
+          <a:gradFill flip="none" rotWithShape="1">
+            <a:gsLst>
+              <a:gs pos="0">
+                <a:schemeClr val="bg2">
+                  <a:lumMod val="40000"/>
+                  <a:lumOff val="60000"/>
+                  <a:alpha val="7000"/>
+                </a:schemeClr>
+              </a:gs>
+              <a:gs pos="69000">
+                <a:schemeClr val="bg2">
+                  <a:lumMod val="40000"/>
+                  <a:lumOff val="60000"/>
+                  <a:alpha val="0"/>
+                </a:schemeClr>
+              </a:gs>
+              <a:gs pos="36000">
+                <a:schemeClr val="bg2">
+                  <a:lumMod val="40000"/>
+                  <a:lumOff val="60000"/>
+                  <a:alpha val="6000"/>
+                </a:schemeClr>
+              </a:gs>
+            </a:gsLst>
+            <a:path path="circle">
+              <a:fillToRect l="50000" t="50000" r="50000" b="50000"/>
+            </a:path>
+            <a:tileRect/>
+          </a:gradFill>
+          <a:ln>
+            <a:noFill/>
+          </a:ln>
+          <a:effectLst/>
+        </p:spPr>
+        <p:style>
+          <a:lnRef idx="1">
+            <a:schemeClr val="accent1"/>
+          </a:lnRef>
+          <a:fillRef idx="3">
+            <a:schemeClr val="accent1"/>
+          </a:fillRef>
+          <a:effectRef idx="2">
+            <a:schemeClr val="accent1"/>
+          </a:effectRef>
+          <a:fontRef idx="minor">
+            <a:schemeClr val="lt1"/>
+          </a:fontRef>
+        </p:style>
+      </p:sp>
+      <p:pic>
+        <p:nvPicPr>
+          <p:cNvPr id="15" name="Picture 14">
+            <a:extLst>
+              <a:ext uri="{FF2B5EF4-FFF2-40B4-BE49-F238E27FC236}">
+                <a16:creationId xmlns:a16="http://schemas.microsoft.com/office/drawing/2014/main" id="{72E47EEC-33C8-4EC3-8BFC-BB02B4171FDA}"/>
+              </a:ext>
+              <a:ext uri="{C183D7F6-B498-43B3-948B-1728B52AA6E4}">
+                <adec:decorative xmlns:adec="http://schemas.microsoft.com/office/drawing/2017/decorative" val="1"/>
+              </a:ext>
+            </a:extLst>
+          </p:cNvPr>
+          <p:cNvPicPr>
+            <a:picLocks noGrp="1" noRot="1" noChangeAspect="1" noMove="1" noResize="1" noEditPoints="1" noAdjustHandles="1" noChangeArrowheads="1" noChangeShapeType="1" noCrop="1"/>
+          </p:cNvPicPr>
+          <p:nvPr>
+            <p:extLst>
+              <p:ext uri="{386F3935-93C4-4BCD-93E2-E3B085C9AB24}">
+                <p16:designElem xmlns:p16="http://schemas.microsoft.com/office/powerpoint/2015/main" val="1"/>
+              </p:ext>
+            </p:extLst>
+          </p:nvPr>
+        </p:nvPicPr>
+        <p:blipFill rotWithShape="1">
+          <a:blip r:embed="rId6">
+            <a:extLst>
+              <a:ext uri="{28A0092B-C50C-407E-A947-70E740481C1C}">
+                <a14:useLocalDpi xmlns:a14="http://schemas.microsoft.com/office/drawing/2010/main" val="0"/>
+              </a:ext>
+            </a:extLst>
+          </a:blip>
+          <a:srcRect t="28813"/>
+          <a:stretch/>
+        </p:blipFill>
+        <p:spPr>
+          <a:xfrm>
+            <a:off x="7999412" y="0"/>
+            <a:ext cx="1603387" cy="1141407"/>
+          </a:xfrm>
+          <a:prstGeom prst="rect">
+            <a:avLst/>
+          </a:prstGeom>
+        </p:spPr>
+      </p:pic>
+      <p:pic>
+        <p:nvPicPr>
+          <p:cNvPr id="17" name="Picture 16">
+            <a:extLst>
+              <a:ext uri="{FF2B5EF4-FFF2-40B4-BE49-F238E27FC236}">
+                <a16:creationId xmlns:a16="http://schemas.microsoft.com/office/drawing/2014/main" id="{A8BC9CC6-50D5-4C61-9EDE-315A1B5F14E4}"/>
+              </a:ext>
+              <a:ext uri="{C183D7F6-B498-43B3-948B-1728B52AA6E4}">
+                <adec:decorative xmlns:adec="http://schemas.microsoft.com/office/drawing/2017/decorative" val="1"/>
+              </a:ext>
+            </a:extLst>
+          </p:cNvPr>
+          <p:cNvPicPr>
+            <a:picLocks noGrp="1" noRot="1" noChangeAspect="1" noMove="1" noResize="1" noEditPoints="1" noAdjustHandles="1" noChangeArrowheads="1" noChangeShapeType="1" noCrop="1"/>
+          </p:cNvPicPr>
+          <p:nvPr>
+            <p:extLst>
+              <p:ext uri="{386F3935-93C4-4BCD-93E2-E3B085C9AB24}">
+                <p16:designElem xmlns:p16="http://schemas.microsoft.com/office/powerpoint/2015/main" val="1"/>
+              </p:ext>
+            </p:extLst>
+          </p:nvPr>
+        </p:nvPicPr>
+        <p:blipFill rotWithShape="1">
+          <a:blip r:embed="rId7">
+            <a:extLst>
+              <a:ext uri="{28A0092B-C50C-407E-A947-70E740481C1C}">
+                <a14:useLocalDpi xmlns:a14="http://schemas.microsoft.com/office/drawing/2010/main" val="0"/>
+              </a:ext>
+            </a:extLst>
+          </a:blip>
+          <a:srcRect b="23320"/>
+          <a:stretch/>
+        </p:blipFill>
+        <p:spPr>
+          <a:xfrm>
+            <a:off x="8609012" y="6096000"/>
+            <a:ext cx="993734" cy="762000"/>
+          </a:xfrm>
+          <a:prstGeom prst="rect">
+            <a:avLst/>
+          </a:prstGeom>
+        </p:spPr>
+      </p:pic>
+      <p:sp>
+        <p:nvSpPr>
+          <p:cNvPr id="19" name="Rectangle 18">
+            <a:extLst>
+              <a:ext uri="{FF2B5EF4-FFF2-40B4-BE49-F238E27FC236}">
+                <a16:creationId xmlns:a16="http://schemas.microsoft.com/office/drawing/2014/main" id="{CED2641B-4430-4CF4-89AB-3FADDD630F25}"/>
+              </a:ext>
+              <a:ext uri="{C183D7F6-B498-43B3-948B-1728B52AA6E4}">
+                <adec:decorative xmlns:adec="http://schemas.microsoft.com/office/drawing/2017/decorative" val="1"/>
+              </a:ext>
+            </a:extLst>
+          </p:cNvPr>
+          <p:cNvSpPr>
+            <a:spLocks noGrp="1" noRot="1" noChangeAspect="1" noMove="1" noResize="1" noEditPoints="1" noAdjustHandles="1" noChangeArrowheads="1" noChangeShapeType="1" noTextEdit="1"/>
+          </p:cNvSpPr>
+          <p:nvPr>
+            <p:extLst>
+              <p:ext uri="{386F3935-93C4-4BCD-93E2-E3B085C9AB24}">
+                <p16:designElem xmlns:p16="http://schemas.microsoft.com/office/powerpoint/2015/main" val="1"/>
+              </p:ext>
+            </p:extLst>
+          </p:nvPr>
+        </p:nvSpPr>
+        <p:spPr>
+          <a:xfrm>
+            <a:off x="10437812" y="0"/>
+            <a:ext cx="685800" cy="1143000"/>
+          </a:xfrm>
+          <a:prstGeom prst="rect">
+            <a:avLst/>
+          </a:prstGeom>
+          <a:solidFill>
+            <a:schemeClr val="accent1"/>
+          </a:solidFill>
+          <a:ln>
+            <a:noFill/>
+          </a:ln>
+        </p:spPr>
+        <p:style>
+          <a:lnRef idx="1">
+            <a:schemeClr val="accent1"/>
+          </a:lnRef>
+          <a:fillRef idx="3">
+            <a:schemeClr val="accent1"/>
+          </a:fillRef>
+          <a:effectRef idx="2">
+            <a:schemeClr val="accent1"/>
+          </a:effectRef>
+          <a:fontRef idx="minor">
+            <a:schemeClr val="lt1"/>
+          </a:fontRef>
+        </p:style>
+      </p:sp>
+      <p:sp useBgFill="1">
+        <p:nvSpPr>
+          <p:cNvPr id="21" name="Rectangle 20">
+            <a:extLst>
+              <a:ext uri="{FF2B5EF4-FFF2-40B4-BE49-F238E27FC236}">
+                <a16:creationId xmlns:a16="http://schemas.microsoft.com/office/drawing/2014/main" id="{C28D0172-F2E0-4763-9C35-F022664959D8}"/>
+              </a:ext>
+              <a:ext uri="{C183D7F6-B498-43B3-948B-1728B52AA6E4}">
+                <adec:decorative xmlns:adec="http://schemas.microsoft.com/office/drawing/2017/decorative" val="1"/>
+              </a:ext>
+            </a:extLst>
+          </p:cNvPr>
+          <p:cNvSpPr>
+            <a:spLocks noGrp="1" noRot="1" noChangeAspect="1" noMove="1" noResize="1" noEditPoints="1" noAdjustHandles="1" noChangeArrowheads="1" noChangeShapeType="1" noTextEdit="1"/>
+          </p:cNvSpPr>
+          <p:nvPr>
+            <p:extLst>
+              <p:ext uri="{386F3935-93C4-4BCD-93E2-E3B085C9AB24}">
+                <p16:designElem xmlns:p16="http://schemas.microsoft.com/office/powerpoint/2015/main" val="1"/>
+              </p:ext>
+            </p:extLst>
+          </p:nvPr>
+        </p:nvSpPr>
+        <p:spPr>
+          <a:xfrm>
+            <a:off x="0" y="-5"/>
+            <a:ext cx="12191695" cy="4730744"/>
+          </a:xfrm>
+          <a:prstGeom prst="rect">
+            <a:avLst/>
+          </a:prstGeom>
+          <a:ln>
+            <a:noFill/>
+          </a:ln>
+        </p:spPr>
+        <p:style>
+          <a:lnRef idx="2">
+            <a:schemeClr val="accent1">
+              <a:shade val="50000"/>
+            </a:schemeClr>
+          </a:lnRef>
+          <a:fillRef idx="1">
+            <a:schemeClr val="accent1"/>
+          </a:fillRef>
+          <a:effectRef idx="0">
+            <a:schemeClr val="accent1"/>
+          </a:effectRef>
+          <a:fontRef idx="minor">
+            <a:schemeClr val="lt1"/>
+          </a:fontRef>
+        </p:style>
+        <p:txBody>
+          <a:bodyPr rtlCol="0" anchor="ctr"/>
+          <a:lstStyle/>
+          <a:p>
+            <a:pPr algn="ctr"/>
+            <a:endParaRPr lang="en-US"/>
+          </a:p>
+        </p:txBody>
+      </p:sp>
+      <p:sp>
+        <p:nvSpPr>
+          <p:cNvPr id="23" name="Freeform: Shape 22">
+            <a:extLst>
+              <a:ext uri="{FF2B5EF4-FFF2-40B4-BE49-F238E27FC236}">
+                <a16:creationId xmlns:a16="http://schemas.microsoft.com/office/drawing/2014/main" id="{DF6FB2B2-CE21-407F-B22E-302DADC2C3D3}"/>
+              </a:ext>
+              <a:ext uri="{C183D7F6-B498-43B3-948B-1728B52AA6E4}">
+                <adec:decorative xmlns:adec="http://schemas.microsoft.com/office/drawing/2017/decorative" val="1"/>
+              </a:ext>
+            </a:extLst>
+          </p:cNvPr>
+          <p:cNvSpPr>
+            <a:spLocks noGrp="1" noRot="1" noChangeAspect="1" noMove="1" noResize="1" noEditPoints="1" noAdjustHandles="1" noChangeArrowheads="1" noChangeShapeType="1" noTextEdit="1"/>
+          </p:cNvSpPr>
+          <p:nvPr>
+            <p:extLst>
+              <p:ext uri="{386F3935-93C4-4BCD-93E2-E3B085C9AB24}">
+                <p16:designElem xmlns:p16="http://schemas.microsoft.com/office/powerpoint/2015/main" val="1"/>
+              </p:ext>
+            </p:extLst>
+          </p:nvPr>
+        </p:nvSpPr>
+        <p:spPr>
+          <a:xfrm>
+            <a:off x="0" y="4055533"/>
+            <a:ext cx="12192000" cy="2802467"/>
+          </a:xfrm>
+          <a:custGeom>
+            <a:avLst/>
+            <a:gdLst>
+              <a:gd name="connsiteX0" fmla="*/ 1 w 12192000"/>
+              <a:gd name="connsiteY0" fmla="*/ 0 h 2802467"/>
+              <a:gd name="connsiteX1" fmla="*/ 71932 w 12192000"/>
+              <a:gd name="connsiteY1" fmla="*/ 12261 h 2802467"/>
+              <a:gd name="connsiteX2" fmla="*/ 282848 w 12192000"/>
+              <a:gd name="connsiteY2" fmla="*/ 48342 h 2802467"/>
+              <a:gd name="connsiteX3" fmla="*/ 436464 w 12192000"/>
+              <a:gd name="connsiteY3" fmla="*/ 73565 h 2802467"/>
+              <a:gd name="connsiteX4" fmla="*/ 619339 w 12192000"/>
+              <a:gd name="connsiteY4" fmla="*/ 100188 h 2802467"/>
+              <a:gd name="connsiteX5" fmla="*/ 836351 w 12192000"/>
+              <a:gd name="connsiteY5" fmla="*/ 132066 h 2802467"/>
+              <a:gd name="connsiteX6" fmla="*/ 1076528 w 12192000"/>
+              <a:gd name="connsiteY6" fmla="*/ 165696 h 2802467"/>
+              <a:gd name="connsiteX7" fmla="*/ 1347183 w 12192000"/>
+              <a:gd name="connsiteY7" fmla="*/ 201077 h 2802467"/>
+              <a:gd name="connsiteX8" fmla="*/ 1642223 w 12192000"/>
+              <a:gd name="connsiteY8" fmla="*/ 238560 h 2802467"/>
+              <a:gd name="connsiteX9" fmla="*/ 1962864 w 12192000"/>
+              <a:gd name="connsiteY9" fmla="*/ 276043 h 2802467"/>
+              <a:gd name="connsiteX10" fmla="*/ 2304232 w 12192000"/>
+              <a:gd name="connsiteY10" fmla="*/ 314226 h 2802467"/>
+              <a:gd name="connsiteX11" fmla="*/ 2672421 w 12192000"/>
+              <a:gd name="connsiteY11" fmla="*/ 349608 h 2802467"/>
+              <a:gd name="connsiteX12" fmla="*/ 3057678 w 12192000"/>
+              <a:gd name="connsiteY12" fmla="*/ 383587 h 2802467"/>
+              <a:gd name="connsiteX13" fmla="*/ 3464881 w 12192000"/>
+              <a:gd name="connsiteY13" fmla="*/ 414415 h 2802467"/>
+              <a:gd name="connsiteX14" fmla="*/ 3889152 w 12192000"/>
+              <a:gd name="connsiteY14" fmla="*/ 443840 h 2802467"/>
+              <a:gd name="connsiteX15" fmla="*/ 4331710 w 12192000"/>
+              <a:gd name="connsiteY15" fmla="*/ 471515 h 2802467"/>
+              <a:gd name="connsiteX16" fmla="*/ 4558476 w 12192000"/>
+              <a:gd name="connsiteY16" fmla="*/ 481323 h 2802467"/>
+              <a:gd name="connsiteX17" fmla="*/ 4790118 w 12192000"/>
+              <a:gd name="connsiteY17" fmla="*/ 492183 h 2802467"/>
+              <a:gd name="connsiteX18" fmla="*/ 5025418 w 12192000"/>
+              <a:gd name="connsiteY18" fmla="*/ 502342 h 2802467"/>
+              <a:gd name="connsiteX19" fmla="*/ 5261937 w 12192000"/>
+              <a:gd name="connsiteY19" fmla="*/ 508998 h 2802467"/>
+              <a:gd name="connsiteX20" fmla="*/ 5503332 w 12192000"/>
+              <a:gd name="connsiteY20" fmla="*/ 514953 h 2802467"/>
+              <a:gd name="connsiteX21" fmla="*/ 5747166 w 12192000"/>
+              <a:gd name="connsiteY21" fmla="*/ 521259 h 2802467"/>
+              <a:gd name="connsiteX22" fmla="*/ 5995877 w 12192000"/>
+              <a:gd name="connsiteY22" fmla="*/ 525462 h 2802467"/>
+              <a:gd name="connsiteX23" fmla="*/ 6247026 w 12192000"/>
+              <a:gd name="connsiteY23" fmla="*/ 525462 h 2802467"/>
+              <a:gd name="connsiteX24" fmla="*/ 6500613 w 12192000"/>
+              <a:gd name="connsiteY24" fmla="*/ 527564 h 2802467"/>
+              <a:gd name="connsiteX25" fmla="*/ 6756639 w 12192000"/>
+              <a:gd name="connsiteY25" fmla="*/ 525462 h 2802467"/>
+              <a:gd name="connsiteX26" fmla="*/ 7016322 w 12192000"/>
+              <a:gd name="connsiteY26" fmla="*/ 521259 h 2802467"/>
+              <a:gd name="connsiteX27" fmla="*/ 7276005 w 12192000"/>
+              <a:gd name="connsiteY27" fmla="*/ 517405 h 2802467"/>
+              <a:gd name="connsiteX28" fmla="*/ 7539345 w 12192000"/>
+              <a:gd name="connsiteY28" fmla="*/ 508998 h 2802467"/>
+              <a:gd name="connsiteX29" fmla="*/ 7805124 w 12192000"/>
+              <a:gd name="connsiteY29" fmla="*/ 500240 h 2802467"/>
+              <a:gd name="connsiteX30" fmla="*/ 8070903 w 12192000"/>
+              <a:gd name="connsiteY30" fmla="*/ 490081 h 2802467"/>
+              <a:gd name="connsiteX31" fmla="*/ 8339121 w 12192000"/>
+              <a:gd name="connsiteY31" fmla="*/ 475719 h 2802467"/>
+              <a:gd name="connsiteX32" fmla="*/ 8609776 w 12192000"/>
+              <a:gd name="connsiteY32" fmla="*/ 458553 h 2802467"/>
+              <a:gd name="connsiteX33" fmla="*/ 8881651 w 12192000"/>
+              <a:gd name="connsiteY33" fmla="*/ 442089 h 2802467"/>
+              <a:gd name="connsiteX34" fmla="*/ 9153526 w 12192000"/>
+              <a:gd name="connsiteY34" fmla="*/ 421070 h 2802467"/>
+              <a:gd name="connsiteX35" fmla="*/ 9429058 w 12192000"/>
+              <a:gd name="connsiteY35" fmla="*/ 395848 h 2802467"/>
+              <a:gd name="connsiteX36" fmla="*/ 9700933 w 12192000"/>
+              <a:gd name="connsiteY36" fmla="*/ 370626 h 2802467"/>
+              <a:gd name="connsiteX37" fmla="*/ 9977684 w 12192000"/>
+              <a:gd name="connsiteY37" fmla="*/ 341550 h 2802467"/>
+              <a:gd name="connsiteX38" fmla="*/ 10255655 w 12192000"/>
+              <a:gd name="connsiteY38" fmla="*/ 309672 h 2802467"/>
+              <a:gd name="connsiteX39" fmla="*/ 10529968 w 12192000"/>
+              <a:gd name="connsiteY39" fmla="*/ 276043 h 2802467"/>
+              <a:gd name="connsiteX40" fmla="*/ 10807939 w 12192000"/>
+              <a:gd name="connsiteY40" fmla="*/ 236808 h 2802467"/>
+              <a:gd name="connsiteX41" fmla="*/ 11084690 w 12192000"/>
+              <a:gd name="connsiteY41" fmla="*/ 194771 h 2802467"/>
+              <a:gd name="connsiteX42" fmla="*/ 11362661 w 12192000"/>
+              <a:gd name="connsiteY42" fmla="*/ 153085 h 2802467"/>
+              <a:gd name="connsiteX43" fmla="*/ 11639412 w 12192000"/>
+              <a:gd name="connsiteY43" fmla="*/ 104392 h 2802467"/>
+              <a:gd name="connsiteX44" fmla="*/ 11914945 w 12192000"/>
+              <a:gd name="connsiteY44" fmla="*/ 54648 h 2802467"/>
+              <a:gd name="connsiteX45" fmla="*/ 12191696 w 12192000"/>
+              <a:gd name="connsiteY45" fmla="*/ 2452 h 2802467"/>
+              <a:gd name="connsiteX46" fmla="*/ 12191696 w 12192000"/>
+              <a:gd name="connsiteY46" fmla="*/ 2236410 h 2802467"/>
+              <a:gd name="connsiteX47" fmla="*/ 12192000 w 12192000"/>
+              <a:gd name="connsiteY47" fmla="*/ 2236410 h 2802467"/>
+              <a:gd name="connsiteX48" fmla="*/ 12192000 w 12192000"/>
+              <a:gd name="connsiteY48" fmla="*/ 2802467 h 2802467"/>
+              <a:gd name="connsiteX49" fmla="*/ 12191696 w 12192000"/>
+              <a:gd name="connsiteY49" fmla="*/ 2802467 h 2802467"/>
+              <a:gd name="connsiteX50" fmla="*/ 0 w 12192000"/>
+              <a:gd name="connsiteY50" fmla="*/ 2802467 h 2802467"/>
+              <a:gd name="connsiteX51" fmla="*/ 0 w 12192000"/>
+              <a:gd name="connsiteY51" fmla="*/ 2236410 h 2802467"/>
+              <a:gd name="connsiteX52" fmla="*/ 1 w 12192000"/>
+              <a:gd name="connsiteY52" fmla="*/ 2236410 h 2802467"/>
+            </a:gdLst>
+            <a:ahLst/>
+            <a:cxnLst>
+              <a:cxn ang="0">
+                <a:pos x="connsiteX0" y="connsiteY0"/>
+              </a:cxn>
+              <a:cxn ang="0">
+                <a:pos x="connsiteX1" y="connsiteY1"/>
+              </a:cxn>
+              <a:cxn ang="0">
+                <a:pos x="connsiteX2" y="connsiteY2"/>
+              </a:cxn>
+              <a:cxn ang="0">
+                <a:pos x="connsiteX3" y="connsiteY3"/>
+              </a:cxn>
+              <a:cxn ang="0">
+                <a:pos x="connsiteX4" y="connsiteY4"/>
+              </a:cxn>
+              <a:cxn ang="0">
+                <a:pos x="connsiteX5" y="connsiteY5"/>
+              </a:cxn>
+              <a:cxn ang="0">
+                <a:pos x="connsiteX6" y="connsiteY6"/>
+              </a:cxn>
+              <a:cxn ang="0">
+                <a:pos x="connsiteX7" y="connsiteY7"/>
+              </a:cxn>
+              <a:cxn ang="0">
+                <a:pos x="connsiteX8" y="connsiteY8"/>
+              </a:cxn>
+              <a:cxn ang="0">
+                <a:pos x="connsiteX9" y="connsiteY9"/>
+              </a:cxn>
+              <a:cxn ang="0">
+                <a:pos x="connsiteX10" y="connsiteY10"/>
+              </a:cxn>
+              <a:cxn ang="0">
+                <a:pos x="connsiteX11" y="connsiteY11"/>
+              </a:cxn>
+              <a:cxn ang="0">
+                <a:pos x="connsiteX12" y="connsiteY12"/>
+              </a:cxn>
+              <a:cxn ang="0">
+                <a:pos x="connsiteX13" y="connsiteY13"/>
+              </a:cxn>
+              <a:cxn ang="0">
+                <a:pos x="connsiteX14" y="connsiteY14"/>
+              </a:cxn>
+              <a:cxn ang="0">
+                <a:pos x="connsiteX15" y="connsiteY15"/>
+              </a:cxn>
+              <a:cxn ang="0">
+                <a:pos x="connsiteX16" y="connsiteY16"/>
+              </a:cxn>
+              <a:cxn ang="0">
+                <a:pos x="connsiteX17" y="connsiteY17"/>
+              </a:cxn>
+              <a:cxn ang="0">
+                <a:pos x="connsiteX18" y="connsiteY18"/>
+              </a:cxn>
+              <a:cxn ang="0">
+                <a:pos x="connsiteX19" y="connsiteY19"/>
+              </a:cxn>
+              <a:cxn ang="0">
+                <a:pos x="connsiteX20" y="connsiteY20"/>
+              </a:cxn>
+              <a:cxn ang="0">
+                <a:pos x="connsiteX21" y="connsiteY21"/>
+              </a:cxn>
+              <a:cxn ang="0">
+                <a:pos x="connsiteX22" y="connsiteY22"/>
+              </a:cxn>
+              <a:cxn ang="0">
+                <a:pos x="connsiteX23" y="connsiteY23"/>
+              </a:cxn>
+              <a:cxn ang="0">
+                <a:pos x="connsiteX24" y="connsiteY24"/>
+              </a:cxn>
+              <a:cxn ang="0">
+                <a:pos x="connsiteX25" y="connsiteY25"/>
+              </a:cxn>
+              <a:cxn ang="0">
+                <a:pos x="connsiteX26" y="connsiteY26"/>
+              </a:cxn>
+              <a:cxn ang="0">
+                <a:pos x="connsiteX27" y="connsiteY27"/>
+              </a:cxn>
+              <a:cxn ang="0">
+                <a:pos x="connsiteX28" y="connsiteY28"/>
+              </a:cxn>
+              <a:cxn ang="0">
+                <a:pos x="connsiteX29" y="connsiteY29"/>
+              </a:cxn>
+              <a:cxn ang="0">
+                <a:pos x="connsiteX30" y="connsiteY30"/>
+              </a:cxn>
+              <a:cxn ang="0">
+                <a:pos x="connsiteX31" y="connsiteY31"/>
+              </a:cxn>
+              <a:cxn ang="0">
+                <a:pos x="connsiteX32" y="connsiteY32"/>
+              </a:cxn>
+              <a:cxn ang="0">
+                <a:pos x="connsiteX33" y="connsiteY33"/>
+              </a:cxn>
+              <a:cxn ang="0">
+                <a:pos x="connsiteX34" y="connsiteY34"/>
+              </a:cxn>
+              <a:cxn ang="0">
+                <a:pos x="connsiteX35" y="connsiteY35"/>
+              </a:cxn>
+              <a:cxn ang="0">
+                <a:pos x="connsiteX36" y="connsiteY36"/>
+              </a:cxn>
+              <a:cxn ang="0">
+                <a:pos x="connsiteX37" y="connsiteY37"/>
+              </a:cxn>
+              <a:cxn ang="0">
+                <a:pos x="connsiteX38" y="connsiteY38"/>
+              </a:cxn>
+              <a:cxn ang="0">
+                <a:pos x="connsiteX39" y="connsiteY39"/>
+              </a:cxn>
+              <a:cxn ang="0">
+                <a:pos x="connsiteX40" y="connsiteY40"/>
+              </a:cxn>
+              <a:cxn ang="0">
+                <a:pos x="connsiteX41" y="connsiteY41"/>
+              </a:cxn>
+              <a:cxn ang="0">
+                <a:pos x="connsiteX42" y="connsiteY42"/>
+              </a:cxn>
+              <a:cxn ang="0">
+                <a:pos x="connsiteX43" y="connsiteY43"/>
+              </a:cxn>
+              <a:cxn ang="0">
+                <a:pos x="connsiteX44" y="connsiteY44"/>
+              </a:cxn>
+              <a:cxn ang="0">
+                <a:pos x="connsiteX45" y="connsiteY45"/>
+              </a:cxn>
+              <a:cxn ang="0">
+                <a:pos x="connsiteX46" y="connsiteY46"/>
+              </a:cxn>
+              <a:cxn ang="0">
+                <a:pos x="connsiteX47" y="connsiteY47"/>
+              </a:cxn>
+              <a:cxn ang="0">
+                <a:pos x="connsiteX48" y="connsiteY48"/>
+              </a:cxn>
+              <a:cxn ang="0">
+                <a:pos x="connsiteX49" y="connsiteY49"/>
+              </a:cxn>
+              <a:cxn ang="0">
+                <a:pos x="connsiteX50" y="connsiteY50"/>
+              </a:cxn>
+              <a:cxn ang="0">
+                <a:pos x="connsiteX51" y="connsiteY51"/>
+              </a:cxn>
+              <a:cxn ang="0">
+                <a:pos x="connsiteX52" y="connsiteY52"/>
+              </a:cxn>
+            </a:cxnLst>
+            <a:rect l="l" t="t" r="r" b="b"/>
+            <a:pathLst>
+              <a:path w="12192000" h="2802467">
+                <a:moveTo>
+                  <a:pt x="1" y="0"/>
+                </a:moveTo>
+                <a:lnTo>
+                  <a:pt x="71932" y="12261"/>
+                </a:lnTo>
+                <a:lnTo>
+                  <a:pt x="282848" y="48342"/>
+                </a:lnTo>
+                <a:lnTo>
+                  <a:pt x="436464" y="73565"/>
+                </a:lnTo>
+                <a:lnTo>
+                  <a:pt x="619339" y="100188"/>
+                </a:lnTo>
+                <a:lnTo>
+                  <a:pt x="836351" y="132066"/>
+                </a:lnTo>
+                <a:lnTo>
+                  <a:pt x="1076528" y="165696"/>
+                </a:lnTo>
+                <a:lnTo>
+                  <a:pt x="1347183" y="201077"/>
+                </a:lnTo>
+                <a:lnTo>
+                  <a:pt x="1642223" y="238560"/>
+                </a:lnTo>
+                <a:lnTo>
+                  <a:pt x="1962864" y="276043"/>
+                </a:lnTo>
+                <a:lnTo>
+                  <a:pt x="2304232" y="314226"/>
+                </a:lnTo>
+                <a:lnTo>
+                  <a:pt x="2672421" y="349608"/>
+                </a:lnTo>
+                <a:lnTo>
+                  <a:pt x="3057678" y="383587"/>
+                </a:lnTo>
+                <a:lnTo>
+                  <a:pt x="3464881" y="414415"/>
+                </a:lnTo>
+                <a:lnTo>
+                  <a:pt x="3889152" y="443840"/>
+                </a:lnTo>
+                <a:lnTo>
+                  <a:pt x="4331710" y="471515"/>
+                </a:lnTo>
+                <a:lnTo>
+                  <a:pt x="4558476" y="481323"/>
+                </a:lnTo>
+                <a:lnTo>
+                  <a:pt x="4790118" y="492183"/>
+                </a:lnTo>
+                <a:lnTo>
+                  <a:pt x="5025418" y="502342"/>
+                </a:lnTo>
+                <a:lnTo>
+                  <a:pt x="5261937" y="508998"/>
+                </a:lnTo>
+                <a:lnTo>
+                  <a:pt x="5503332" y="514953"/>
+                </a:lnTo>
+                <a:lnTo>
+                  <a:pt x="5747166" y="521259"/>
+                </a:lnTo>
+                <a:lnTo>
+                  <a:pt x="5995877" y="525462"/>
+                </a:lnTo>
+                <a:lnTo>
+                  <a:pt x="6247026" y="525462"/>
+                </a:lnTo>
+                <a:lnTo>
+                  <a:pt x="6500613" y="527564"/>
+                </a:lnTo>
+                <a:lnTo>
+                  <a:pt x="6756639" y="525462"/>
+                </a:lnTo>
+                <a:lnTo>
+                  <a:pt x="7016322" y="521259"/>
+                </a:lnTo>
+                <a:lnTo>
+                  <a:pt x="7276005" y="517405"/>
+                </a:lnTo>
+                <a:lnTo>
+                  <a:pt x="7539345" y="508998"/>
+                </a:lnTo>
+                <a:lnTo>
+                  <a:pt x="7805124" y="500240"/>
+                </a:lnTo>
+                <a:lnTo>
+                  <a:pt x="8070903" y="490081"/>
+                </a:lnTo>
+                <a:lnTo>
+                  <a:pt x="8339121" y="475719"/>
+                </a:lnTo>
+                <a:lnTo>
+                  <a:pt x="8609776" y="458553"/>
+                </a:lnTo>
+                <a:lnTo>
+                  <a:pt x="8881651" y="442089"/>
+                </a:lnTo>
+                <a:lnTo>
+                  <a:pt x="9153526" y="421070"/>
+                </a:lnTo>
+                <a:lnTo>
+                  <a:pt x="9429058" y="395848"/>
+                </a:lnTo>
+                <a:lnTo>
+                  <a:pt x="9700933" y="370626"/>
+                </a:lnTo>
+                <a:lnTo>
+                  <a:pt x="9977684" y="341550"/>
+                </a:lnTo>
+                <a:lnTo>
+                  <a:pt x="10255655" y="309672"/>
+                </a:lnTo>
+                <a:lnTo>
+                  <a:pt x="10529968" y="276043"/>
+                </a:lnTo>
+                <a:lnTo>
+                  <a:pt x="10807939" y="236808"/>
+                </a:lnTo>
+                <a:lnTo>
+                  <a:pt x="11084690" y="194771"/>
+                </a:lnTo>
+                <a:lnTo>
+                  <a:pt x="11362661" y="153085"/>
+                </a:lnTo>
+                <a:lnTo>
+                  <a:pt x="11639412" y="104392"/>
+                </a:lnTo>
+                <a:lnTo>
+                  <a:pt x="11914945" y="54648"/>
+                </a:lnTo>
+                <a:lnTo>
+                  <a:pt x="12191696" y="2452"/>
+                </a:lnTo>
+                <a:lnTo>
+                  <a:pt x="12191696" y="2236410"/>
+                </a:lnTo>
+                <a:lnTo>
+                  <a:pt x="12192000" y="2236410"/>
+                </a:lnTo>
+                <a:lnTo>
+                  <a:pt x="12192000" y="2802467"/>
+                </a:lnTo>
+                <a:lnTo>
+                  <a:pt x="12191696" y="2802467"/>
+                </a:lnTo>
+                <a:lnTo>
+                  <a:pt x="0" y="2802467"/>
+                </a:lnTo>
+                <a:lnTo>
+                  <a:pt x="0" y="2236410"/>
+                </a:lnTo>
+                <a:lnTo>
+                  <a:pt x="1" y="2236410"/>
+                </a:lnTo>
+                <a:close/>
+              </a:path>
+            </a:pathLst>
+          </a:custGeom>
+          <a:solidFill>
+            <a:schemeClr val="tx2"/>
+          </a:solidFill>
+          <a:ln>
+            <a:noFill/>
+          </a:ln>
+        </p:spPr>
+        <p:style>
+          <a:lnRef idx="2">
+            <a:schemeClr val="accent1">
+              <a:shade val="50000"/>
+            </a:schemeClr>
+          </a:lnRef>
+          <a:fillRef idx="1003">
+            <a:schemeClr val="dk2"/>
+          </a:fillRef>
+          <a:effectRef idx="0">
+            <a:schemeClr val="accent1"/>
+          </a:effectRef>
+          <a:fontRef idx="minor">
+            <a:schemeClr val="lt1"/>
+          </a:fontRef>
+        </p:style>
+        <p:txBody>
+          <a:bodyPr rtlCol="0" anchor="ctr"/>
+          <a:lstStyle/>
+          <a:p>
+            <a:pPr algn="ctr"/>
+            <a:endParaRPr lang="en-US"/>
+          </a:p>
+        </p:txBody>
+      </p:sp>
+      <p:sp>
+        <p:nvSpPr>
+          <p:cNvPr id="25" name="Freeform 16">
+            <a:extLst>
+              <a:ext uri="{FF2B5EF4-FFF2-40B4-BE49-F238E27FC236}">
+                <a16:creationId xmlns:a16="http://schemas.microsoft.com/office/drawing/2014/main" id="{9F2851FB-E841-4509-8A6D-A416376EA380}"/>
+              </a:ext>
+              <a:ext uri="{C183D7F6-B498-43B3-948B-1728B52AA6E4}">
+                <adec:decorative xmlns:adec="http://schemas.microsoft.com/office/drawing/2017/decorative" val="1"/>
+              </a:ext>
+            </a:extLst>
+          </p:cNvPr>
+          <p:cNvSpPr>
+            <a:spLocks noGrp="1" noRot="1" noChangeAspect="1" noMove="1" noResize="1" noEditPoints="1" noAdjustHandles="1" noChangeArrowheads="1" noChangeShapeType="1" noTextEdit="1"/>
+          </p:cNvSpPr>
+          <p:nvPr>
+            <p:extLst>
+              <p:ext uri="{386F3935-93C4-4BCD-93E2-E3B085C9AB24}">
+                <p16:designElem xmlns:p16="http://schemas.microsoft.com/office/powerpoint/2015/main" val="1"/>
+              </p:ext>
+            </p:extLst>
+          </p:nvPr>
+        </p:nvSpPr>
+        <p:spPr>
+          <a:xfrm>
+            <a:off x="8719939" y="3753695"/>
+            <a:ext cx="3472060" cy="825932"/>
+          </a:xfrm>
+          <a:custGeom>
+            <a:avLst/>
+            <a:gdLst>
+              <a:gd name="connsiteX0" fmla="*/ 3470310 w 3472060"/>
+              <a:gd name="connsiteY0" fmla="*/ 0 h 825932"/>
+              <a:gd name="connsiteX1" fmla="*/ 3472060 w 3472060"/>
+              <a:gd name="connsiteY1" fmla="*/ 12850 h 825932"/>
+              <a:gd name="connsiteX2" fmla="*/ 3472060 w 3472060"/>
+              <a:gd name="connsiteY2" fmla="*/ 480529 h 825932"/>
+              <a:gd name="connsiteX3" fmla="*/ 3363699 w 3472060"/>
+              <a:gd name="connsiteY3" fmla="*/ 498471 h 825932"/>
+              <a:gd name="connsiteX4" fmla="*/ 42060 w 3472060"/>
+              <a:gd name="connsiteY4" fmla="*/ 824486 h 825932"/>
+              <a:gd name="connsiteX5" fmla="*/ 0 w 3472060"/>
+              <a:gd name="connsiteY5" fmla="*/ 758452 h 825932"/>
+              <a:gd name="connsiteX6" fmla="*/ 188014 w 3472060"/>
+              <a:gd name="connsiteY6" fmla="*/ 735602 h 825932"/>
+              <a:gd name="connsiteX7" fmla="*/ 284087 w 3472060"/>
+              <a:gd name="connsiteY7" fmla="*/ 722590 h 825932"/>
+              <a:gd name="connsiteX8" fmla="*/ 382288 w 3472060"/>
+              <a:gd name="connsiteY8" fmla="*/ 709392 h 825932"/>
+              <a:gd name="connsiteX9" fmla="*/ 481858 w 3472060"/>
+              <a:gd name="connsiteY9" fmla="*/ 695774 h 825932"/>
+              <a:gd name="connsiteX10" fmla="*/ 581897 w 3472060"/>
+              <a:gd name="connsiteY10" fmla="*/ 680711 h 825932"/>
+              <a:gd name="connsiteX11" fmla="*/ 683670 w 3472060"/>
+              <a:gd name="connsiteY11" fmla="*/ 665256 h 825932"/>
+              <a:gd name="connsiteX12" fmla="*/ 787206 w 3472060"/>
+              <a:gd name="connsiteY12" fmla="*/ 649587 h 825932"/>
+              <a:gd name="connsiteX13" fmla="*/ 892019 w 3472060"/>
+              <a:gd name="connsiteY13" fmla="*/ 632968 h 825932"/>
+              <a:gd name="connsiteX14" fmla="*/ 997620 w 3472060"/>
+              <a:gd name="connsiteY14" fmla="*/ 614667 h 825932"/>
+              <a:gd name="connsiteX15" fmla="*/ 1104727 w 3472060"/>
+              <a:gd name="connsiteY15" fmla="*/ 596741 h 825932"/>
+              <a:gd name="connsiteX16" fmla="*/ 1212669 w 3472060"/>
+              <a:gd name="connsiteY16" fmla="*/ 577397 h 825932"/>
+              <a:gd name="connsiteX17" fmla="*/ 1321506 w 3472060"/>
+              <a:gd name="connsiteY17" fmla="*/ 556988 h 825932"/>
+              <a:gd name="connsiteX18" fmla="*/ 1430709 w 3472060"/>
+              <a:gd name="connsiteY18" fmla="*/ 536607 h 825932"/>
+              <a:gd name="connsiteX19" fmla="*/ 1541050 w 3472060"/>
+              <a:gd name="connsiteY19" fmla="*/ 514481 h 825932"/>
+              <a:gd name="connsiteX20" fmla="*/ 1652805 w 3472060"/>
+              <a:gd name="connsiteY20" fmla="*/ 492202 h 825932"/>
+              <a:gd name="connsiteX21" fmla="*/ 1763708 w 3472060"/>
+              <a:gd name="connsiteY21" fmla="*/ 469161 h 825932"/>
+              <a:gd name="connsiteX22" fmla="*/ 1875795 w 3472060"/>
+              <a:gd name="connsiteY22" fmla="*/ 444641 h 825932"/>
+              <a:gd name="connsiteX23" fmla="*/ 1989128 w 3472060"/>
+              <a:gd name="connsiteY23" fmla="*/ 418995 h 825932"/>
+              <a:gd name="connsiteX24" fmla="*/ 2102476 w 3472060"/>
+              <a:gd name="connsiteY24" fmla="*/ 393438 h 825932"/>
+              <a:gd name="connsiteX25" fmla="*/ 2215549 w 3472060"/>
+              <a:gd name="connsiteY25" fmla="*/ 366291 h 825932"/>
+              <a:gd name="connsiteX26" fmla="*/ 2330490 w 3472060"/>
+              <a:gd name="connsiteY26" fmla="*/ 337455 h 825932"/>
+              <a:gd name="connsiteX27" fmla="*/ 2443333 w 3472060"/>
+              <a:gd name="connsiteY27" fmla="*/ 308983 h 825932"/>
+              <a:gd name="connsiteX28" fmla="*/ 2558014 w 3472060"/>
+              <a:gd name="connsiteY28" fmla="*/ 278646 h 825932"/>
+              <a:gd name="connsiteX29" fmla="*/ 2673621 w 3472060"/>
+              <a:gd name="connsiteY29" fmla="*/ 247421 h 825932"/>
+              <a:gd name="connsiteX30" fmla="*/ 2787008 w 3472060"/>
+              <a:gd name="connsiteY30" fmla="*/ 215853 h 825932"/>
+              <a:gd name="connsiteX31" fmla="*/ 2901442 w 3472060"/>
+              <a:gd name="connsiteY31" fmla="*/ 182011 h 825932"/>
+              <a:gd name="connsiteX32" fmla="*/ 3015722 w 3472060"/>
+              <a:gd name="connsiteY32" fmla="*/ 147286 h 825932"/>
+              <a:gd name="connsiteX33" fmla="*/ 3130018 w 3472060"/>
+              <a:gd name="connsiteY33" fmla="*/ 112649 h 825932"/>
+              <a:gd name="connsiteX34" fmla="*/ 3243551 w 3472060"/>
+              <a:gd name="connsiteY34" fmla="*/ 75688 h 825932"/>
+              <a:gd name="connsiteX35" fmla="*/ 3356992 w 3472060"/>
+              <a:gd name="connsiteY35" fmla="*/ 38197 h 825932"/>
+              <a:gd name="connsiteX36" fmla="*/ 3470310 w 3472060"/>
+              <a:gd name="connsiteY36" fmla="*/ 0 h 825932"/>
+            </a:gdLst>
+            <a:ahLst/>
+            <a:cxnLst>
+              <a:cxn ang="0">
+                <a:pos x="connsiteX0" y="connsiteY0"/>
+              </a:cxn>
+              <a:cxn ang="0">
+                <a:pos x="connsiteX1" y="connsiteY1"/>
+              </a:cxn>
+              <a:cxn ang="0">
+                <a:pos x="connsiteX2" y="connsiteY2"/>
+              </a:cxn>
+              <a:cxn ang="0">
+                <a:pos x="connsiteX3" y="connsiteY3"/>
+              </a:cxn>
+              <a:cxn ang="0">
+                <a:pos x="connsiteX4" y="connsiteY4"/>
+              </a:cxn>
+              <a:cxn ang="0">
+                <a:pos x="connsiteX5" y="connsiteY5"/>
+              </a:cxn>
+              <a:cxn ang="0">
+                <a:pos x="connsiteX6" y="connsiteY6"/>
+              </a:cxn>
+              <a:cxn ang="0">
+                <a:pos x="connsiteX7" y="connsiteY7"/>
+              </a:cxn>
+              <a:cxn ang="0">
+                <a:pos x="connsiteX8" y="connsiteY8"/>
+              </a:cxn>
+              <a:cxn ang="0">
+                <a:pos x="connsiteX9" y="connsiteY9"/>
+              </a:cxn>
+              <a:cxn ang="0">
+                <a:pos x="connsiteX10" y="connsiteY10"/>
+              </a:cxn>
+              <a:cxn ang="0">
+                <a:pos x="connsiteX11" y="connsiteY11"/>
+              </a:cxn>
+              <a:cxn ang="0">
+                <a:pos x="connsiteX12" y="connsiteY12"/>
+              </a:cxn>
+              <a:cxn ang="0">
+                <a:pos x="connsiteX13" y="connsiteY13"/>
+              </a:cxn>
+              <a:cxn ang="0">
+                <a:pos x="connsiteX14" y="connsiteY14"/>
+              </a:cxn>
+              <a:cxn ang="0">
+                <a:pos x="connsiteX15" y="connsiteY15"/>
+              </a:cxn>
+              <a:cxn ang="0">
+                <a:pos x="connsiteX16" y="connsiteY16"/>
+              </a:cxn>
+              <a:cxn ang="0">
+                <a:pos x="connsiteX17" y="connsiteY17"/>
+              </a:cxn>
+              <a:cxn ang="0">
+                <a:pos x="connsiteX18" y="connsiteY18"/>
+              </a:cxn>
+              <a:cxn ang="0">
+                <a:pos x="connsiteX19" y="connsiteY19"/>
+              </a:cxn>
+              <a:cxn ang="0">
+                <a:pos x="connsiteX20" y="connsiteY20"/>
+              </a:cxn>
+              <a:cxn ang="0">
+                <a:pos x="connsiteX21" y="connsiteY21"/>
+              </a:cxn>
+              <a:cxn ang="0">
+                <a:pos x="connsiteX22" y="connsiteY22"/>
+              </a:cxn>
+              <a:cxn ang="0">
+                <a:pos x="connsiteX23" y="connsiteY23"/>
+              </a:cxn>
+              <a:cxn ang="0">
+                <a:pos x="connsiteX24" y="connsiteY24"/>
+              </a:cxn>
+              <a:cxn ang="0">
+                <a:pos x="connsiteX25" y="connsiteY25"/>
+              </a:cxn>
+              <a:cxn ang="0">
+                <a:pos x="connsiteX26" y="connsiteY26"/>
+              </a:cxn>
+              <a:cxn ang="0">
+                <a:pos x="connsiteX27" y="connsiteY27"/>
+              </a:cxn>
+              <a:cxn ang="0">
+                <a:pos x="connsiteX28" y="connsiteY28"/>
+              </a:cxn>
+              <a:cxn ang="0">
+                <a:pos x="connsiteX29" y="connsiteY29"/>
+              </a:cxn>
+              <a:cxn ang="0">
+                <a:pos x="connsiteX30" y="connsiteY30"/>
+              </a:cxn>
+              <a:cxn ang="0">
+                <a:pos x="connsiteX31" y="connsiteY31"/>
+              </a:cxn>
+              <a:cxn ang="0">
+                <a:pos x="connsiteX32" y="connsiteY32"/>
+              </a:cxn>
+              <a:cxn ang="0">
+                <a:pos x="connsiteX33" y="connsiteY33"/>
+              </a:cxn>
+              <a:cxn ang="0">
+                <a:pos x="connsiteX34" y="connsiteY34"/>
+              </a:cxn>
+              <a:cxn ang="0">
+                <a:pos x="connsiteX35" y="connsiteY35"/>
+              </a:cxn>
+              <a:cxn ang="0">
+                <a:pos x="connsiteX36" y="connsiteY36"/>
+              </a:cxn>
+            </a:cxnLst>
+            <a:rect l="l" t="t" r="r" b="b"/>
+            <a:pathLst>
+              <a:path w="3472060" h="825932">
+                <a:moveTo>
+                  <a:pt x="3470310" y="0"/>
+                </a:moveTo>
+                <a:lnTo>
+                  <a:pt x="3472060" y="12850"/>
+                </a:lnTo>
+                <a:lnTo>
+                  <a:pt x="3472060" y="480529"/>
+                </a:lnTo>
+                <a:lnTo>
+                  <a:pt x="3363699" y="498471"/>
+                </a:lnTo>
+                <a:cubicBezTo>
+                  <a:pt x="2435623" y="645518"/>
+                  <a:pt x="603076" y="844866"/>
+                  <a:pt x="42060" y="824486"/>
+                </a:cubicBezTo>
+                <a:cubicBezTo>
+                  <a:pt x="28151" y="802425"/>
+                  <a:pt x="13909" y="780513"/>
+                  <a:pt x="0" y="758452"/>
+                </a:cubicBezTo>
+                <a:lnTo>
+                  <a:pt x="188014" y="735602"/>
+                </a:lnTo>
+                <a:lnTo>
+                  <a:pt x="284087" y="722590"/>
+                </a:lnTo>
+                <a:lnTo>
+                  <a:pt x="382288" y="709392"/>
+                </a:lnTo>
+                <a:lnTo>
+                  <a:pt x="481858" y="695774"/>
+                </a:lnTo>
+                <a:lnTo>
+                  <a:pt x="581897" y="680711"/>
+                </a:lnTo>
+                <a:lnTo>
+                  <a:pt x="683670" y="665256"/>
+                </a:lnTo>
+                <a:lnTo>
+                  <a:pt x="787206" y="649587"/>
+                </a:lnTo>
+                <a:lnTo>
+                  <a:pt x="892019" y="632968"/>
+                </a:lnTo>
+                <a:lnTo>
+                  <a:pt x="997620" y="614667"/>
+                </a:lnTo>
+                <a:lnTo>
+                  <a:pt x="1104727" y="596741"/>
+                </a:lnTo>
+                <a:lnTo>
+                  <a:pt x="1212669" y="577397"/>
+                </a:lnTo>
+                <a:lnTo>
+                  <a:pt x="1321506" y="556988"/>
+                </a:lnTo>
+                <a:lnTo>
+                  <a:pt x="1430709" y="536607"/>
+                </a:lnTo>
+                <a:lnTo>
+                  <a:pt x="1541050" y="514481"/>
+                </a:lnTo>
+                <a:lnTo>
+                  <a:pt x="1652805" y="492202"/>
+                </a:lnTo>
+                <a:lnTo>
+                  <a:pt x="1763708" y="469161"/>
+                </a:lnTo>
+                <a:lnTo>
+                  <a:pt x="1875795" y="444641"/>
+                </a:lnTo>
+                <a:lnTo>
+                  <a:pt x="1989128" y="418995"/>
+                </a:lnTo>
+                <a:lnTo>
+                  <a:pt x="2102476" y="393438"/>
+                </a:lnTo>
+                <a:lnTo>
+                  <a:pt x="2215549" y="366291"/>
+                </a:lnTo>
+                <a:lnTo>
+                  <a:pt x="2330490" y="337455"/>
+                </a:lnTo>
+                <a:lnTo>
+                  <a:pt x="2443333" y="308983"/>
+                </a:lnTo>
+                <a:lnTo>
+                  <a:pt x="2558014" y="278646"/>
+                </a:lnTo>
+                <a:lnTo>
+                  <a:pt x="2673621" y="247421"/>
+                </a:lnTo>
+                <a:lnTo>
+                  <a:pt x="2787008" y="215853"/>
+                </a:lnTo>
+                <a:lnTo>
+                  <a:pt x="2901442" y="182011"/>
+                </a:lnTo>
+                <a:lnTo>
+                  <a:pt x="3015722" y="147286"/>
+                </a:lnTo>
+                <a:lnTo>
+                  <a:pt x="3130018" y="112649"/>
+                </a:lnTo>
+                <a:lnTo>
+                  <a:pt x="3243551" y="75688"/>
+                </a:lnTo>
+                <a:lnTo>
+                  <a:pt x="3356992" y="38197"/>
+                </a:lnTo>
+                <a:lnTo>
+                  <a:pt x="3470310" y="0"/>
+                </a:lnTo>
+                <a:close/>
+              </a:path>
+            </a:pathLst>
+          </a:custGeom>
+          <a:solidFill>
+            <a:schemeClr val="tx1">
+              <a:alpha val="20000"/>
+            </a:schemeClr>
+          </a:solidFill>
+          <a:ln>
+            <a:noFill/>
+          </a:ln>
+        </p:spPr>
+        <p:txBody>
+          <a:bodyPr rtlCol="0" anchor="ctr"/>
+          <a:lstStyle/>
+          <a:p>
+            <a:pPr algn="ctr"/>
+            <a:endParaRPr lang="en-US">
+              <a:solidFill>
+                <a:schemeClr val="tx1"/>
+              </a:solidFill>
+            </a:endParaRPr>
+          </a:p>
+        </p:txBody>
+      </p:sp>
+      <p:sp>
+        <p:nvSpPr>
+          <p:cNvPr id="2" name="Title 1">
+            <a:extLst>
+              <a:ext uri="{FF2B5EF4-FFF2-40B4-BE49-F238E27FC236}">
+                <a16:creationId xmlns:a16="http://schemas.microsoft.com/office/drawing/2014/main" id="{636F71B9-C6A7-4D5D-9C68-1F859B60CD2E}"/>
+              </a:ext>
+            </a:extLst>
+          </p:cNvPr>
+          <p:cNvSpPr>
+            <a:spLocks noGrp="1"/>
+          </p:cNvSpPr>
+          <p:nvPr>
+            <p:ph type="title"/>
+          </p:nvPr>
+        </p:nvSpPr>
+        <p:spPr>
+          <a:xfrm>
+            <a:off x="965505" y="623571"/>
+            <a:ext cx="10260990" cy="3523885"/>
+          </a:xfrm>
+        </p:spPr>
+        <p:txBody>
+          <a:bodyPr vert="horz" lIns="91440" tIns="45720" rIns="91440" bIns="45720" rtlCol="0" anchor="b">
+            <a:normAutofit/>
+          </a:bodyPr>
+          <a:lstStyle/>
+          <a:p>
+            <a:pPr algn="ctr"/>
+            <a:r>
+              <a:rPr lang="en-US" sz="8000"/>
+              <a:t>Thank you !!!</a:t>
+            </a:r>
+          </a:p>
+        </p:txBody>
+      </p:sp>
+      <p:sp>
+        <p:nvSpPr>
+          <p:cNvPr id="4" name="Slide Number Placeholder 3">
+            <a:extLst>
+              <a:ext uri="{FF2B5EF4-FFF2-40B4-BE49-F238E27FC236}">
+                <a16:creationId xmlns:a16="http://schemas.microsoft.com/office/drawing/2014/main" id="{EFC2BD53-2735-4C21-ABAC-4AD554B58748}"/>
+              </a:ext>
+            </a:extLst>
+          </p:cNvPr>
+          <p:cNvSpPr>
+            <a:spLocks noGrp="1"/>
+          </p:cNvSpPr>
+          <p:nvPr>
+            <p:ph type="sldNum" sz="quarter" idx="12"/>
+          </p:nvPr>
+        </p:nvSpPr>
+        <p:spPr>
+          <a:xfrm>
+            <a:off x="11040512" y="6355080"/>
+            <a:ext cx="838199" cy="301752"/>
+          </a:xfrm>
+        </p:spPr>
+        <p:txBody>
+          <a:bodyPr vert="horz" lIns="91440" tIns="45720" rIns="91440" bIns="45720" rtlCol="0" anchor="ctr">
+            <a:normAutofit/>
+          </a:bodyPr>
+          <a:lstStyle/>
+          <a:p>
+            <a:pPr algn="l">
+              <a:lnSpc>
+                <a:spcPct val="90000"/>
+              </a:lnSpc>
+              <a:spcAft>
+                <a:spcPts val="600"/>
+              </a:spcAft>
+            </a:pPr>
+            <a:fld id="{D57F1E4F-1CFF-5643-939E-02111984F565}" type="slidenum">
+              <a:rPr lang="en-US" sz="1400">
+                <a:solidFill>
+                  <a:schemeClr val="bg1">
+                    <a:alpha val="60000"/>
+                  </a:schemeClr>
+                </a:solidFill>
+              </a:rPr>
+              <a:pPr algn="l">
+                <a:lnSpc>
+                  <a:spcPct val="90000"/>
+                </a:lnSpc>
+                <a:spcAft>
+                  <a:spcPts val="600"/>
+                </a:spcAft>
+              </a:pPr>
+              <a:t>45</a:t>
+            </a:fld>
+            <a:endParaRPr lang="en-US" sz="1400">
+              <a:solidFill>
+                <a:schemeClr val="bg1">
+                  <a:alpha val="60000"/>
+                </a:schemeClr>
+              </a:solidFill>
+            </a:endParaRPr>
+          </a:p>
+        </p:txBody>
+      </p:sp>
+      <p:pic>
+        <p:nvPicPr>
+          <p:cNvPr id="18" name="Picture 17">
+            <a:extLst>
+              <a:ext uri="{FF2B5EF4-FFF2-40B4-BE49-F238E27FC236}">
+                <a16:creationId xmlns:a16="http://schemas.microsoft.com/office/drawing/2014/main" id="{DEA344AF-76AD-4224-B704-5FD1F87EFEE8}"/>
+              </a:ext>
+            </a:extLst>
+          </p:cNvPr>
+          <p:cNvPicPr>
+            <a:picLocks noChangeAspect="1"/>
+          </p:cNvPicPr>
+          <p:nvPr/>
+        </p:nvPicPr>
+        <p:blipFill>
+          <a:blip r:embed="rId8"/>
+          <a:stretch>
+            <a:fillRect/>
+          </a:stretch>
+        </p:blipFill>
+        <p:spPr>
+          <a:xfrm>
+            <a:off x="8982075" y="6644259"/>
+            <a:ext cx="3209925" cy="209550"/>
+          </a:xfrm>
+          <a:prstGeom prst="rect">
+            <a:avLst/>
+          </a:prstGeom>
+        </p:spPr>
+      </p:pic>
+      <p:sp>
+        <p:nvSpPr>
+          <p:cNvPr id="20" name="Title 1">
+            <a:extLst>
+              <a:ext uri="{FF2B5EF4-FFF2-40B4-BE49-F238E27FC236}">
+                <a16:creationId xmlns:a16="http://schemas.microsoft.com/office/drawing/2014/main" id="{DFE766DC-96BE-4892-B90E-0D5CF33FF50B}"/>
+              </a:ext>
+            </a:extLst>
+          </p:cNvPr>
+          <p:cNvSpPr txBox="1">
+            <a:spLocks/>
+          </p:cNvSpPr>
+          <p:nvPr/>
+        </p:nvSpPr>
+        <p:spPr>
+          <a:xfrm>
+            <a:off x="4007267" y="4873956"/>
+            <a:ext cx="3739277" cy="767687"/>
+          </a:xfrm>
+          <a:prstGeom prst="rect">
+            <a:avLst/>
+          </a:prstGeom>
+        </p:spPr>
+        <p:txBody>
+          <a:bodyPr vert="horz" lIns="91440" tIns="45720" rIns="91440" bIns="45720" rtlCol="0" anchor="t">
+            <a:noAutofit/>
+          </a:bodyPr>
+          <a:lstStyle>
+            <a:lvl1pPr algn="l" defTabSz="457200" rtl="0" eaLnBrk="1" latinLnBrk="0" hangingPunct="1">
+              <a:spcBef>
+                <a:spcPct val="0"/>
+              </a:spcBef>
+              <a:buNone/>
+              <a:defRPr sz="4200" b="0" i="0" kern="1200">
+                <a:solidFill>
+                  <a:schemeClr val="tx2"/>
+                </a:solidFill>
+                <a:latin typeface="+mj-lt"/>
+                <a:ea typeface="+mj-ea"/>
+                <a:cs typeface="+mj-cs"/>
+              </a:defRPr>
+            </a:lvl1pPr>
+            <a:lvl2pPr eaLnBrk="1" hangingPunct="1">
+              <a:defRPr>
+                <a:solidFill>
+                  <a:schemeClr val="tx2"/>
+                </a:solidFill>
+              </a:defRPr>
+            </a:lvl2pPr>
+            <a:lvl3pPr eaLnBrk="1" hangingPunct="1">
+              <a:defRPr>
+                <a:solidFill>
+                  <a:schemeClr val="tx2"/>
+                </a:solidFill>
+              </a:defRPr>
+            </a:lvl3pPr>
+            <a:lvl4pPr eaLnBrk="1" hangingPunct="1">
+              <a:defRPr>
+                <a:solidFill>
+                  <a:schemeClr val="tx2"/>
+                </a:solidFill>
+              </a:defRPr>
+            </a:lvl4pPr>
+            <a:lvl5pPr eaLnBrk="1" hangingPunct="1">
+              <a:defRPr>
+                <a:solidFill>
+                  <a:schemeClr val="tx2"/>
+                </a:solidFill>
+              </a:defRPr>
+            </a:lvl5pPr>
+            <a:lvl6pPr eaLnBrk="1" hangingPunct="1">
+              <a:defRPr>
+                <a:solidFill>
+                  <a:schemeClr val="tx2"/>
+                </a:solidFill>
+              </a:defRPr>
+            </a:lvl6pPr>
+            <a:lvl7pPr eaLnBrk="1" hangingPunct="1">
+              <a:defRPr>
+                <a:solidFill>
+                  <a:schemeClr val="tx2"/>
+                </a:solidFill>
+              </a:defRPr>
+            </a:lvl7pPr>
+            <a:lvl8pPr eaLnBrk="1" hangingPunct="1">
+              <a:defRPr>
+                <a:solidFill>
+                  <a:schemeClr val="tx2"/>
+                </a:solidFill>
+              </a:defRPr>
+            </a:lvl8pPr>
+            <a:lvl9pPr eaLnBrk="1" hangingPunct="1">
+              <a:defRPr>
+                <a:solidFill>
+                  <a:schemeClr val="tx2"/>
+                </a:solidFill>
+              </a:defRPr>
+            </a:lvl9pPr>
+          </a:lstStyle>
+          <a:p>
+            <a:r>
+              <a:rPr lang="en-CA" dirty="0">
+                <a:solidFill>
+                  <a:schemeClr val="bg1"/>
+                </a:solidFill>
+              </a:rPr>
+              <a:t>Questions???</a:t>
+            </a:r>
+          </a:p>
+        </p:txBody>
+      </p:sp>
+    </p:spTree>
+    <p:extLst>
+      <p:ext uri="{BB962C8B-B14F-4D97-AF65-F5344CB8AC3E}">
+        <p14:creationId xmlns:p14="http://schemas.microsoft.com/office/powerpoint/2010/main" val="991273893"/>
       </p:ext>
     </p:extLst>
   </p:cSld>

</xml_diff>